<commit_message>
Design Demo Update & Edit source in serializer
</commit_message>
<xml_diff>
--- a/Documents/Design_Demo.pptx
+++ b/Documents/Design_Demo.pptx
@@ -5,13 +5,17 @@
     <p:sldMasterId id="2147483648" r:id="rId1"/>
   </p:sldMasterIdLst>
   <p:notesMasterIdLst>
-    <p:notesMasterId r:id="rId6"/>
+    <p:notesMasterId r:id="rId10"/>
   </p:notesMasterIdLst>
   <p:sldIdLst>
     <p:sldId id="257" r:id="rId2"/>
     <p:sldId id="256" r:id="rId3"/>
     <p:sldId id="258" r:id="rId4"/>
-    <p:sldId id="259" r:id="rId5"/>
+    <p:sldId id="265" r:id="rId5"/>
+    <p:sldId id="259" r:id="rId6"/>
+    <p:sldId id="261" r:id="rId7"/>
+    <p:sldId id="262" r:id="rId8"/>
+    <p:sldId id="264" r:id="rId9"/>
   </p:sldIdLst>
   <p:sldSz cx="12192000" cy="6858000"/>
   <p:notesSz cx="6858000" cy="9144000"/>
@@ -111,6 +115,34 @@
     </a:lvl9pPr>
   </p:defaultTextStyle>
   <p:extLst>
+    <p:ext uri="{521415D9-36F7-43E2-AB2F-B90AF26B5E84}">
+      <p14:sectionLst xmlns:p14="http://schemas.microsoft.com/office/powerpoint/2010/main">
+        <p14:section name="SIgn In &amp; Up" id="{5654896B-9CE6-5C43-85D1-7D717D8D2A4E}">
+          <p14:sldIdLst>
+            <p14:sldId id="257"/>
+            <p14:sldId id="256"/>
+          </p14:sldIdLst>
+        </p14:section>
+        <p14:section name=" User Page" id="{DB35F89F-8527-0A43-AB01-9E65E8DE7C37}">
+          <p14:sldIdLst>
+            <p14:sldId id="258"/>
+          </p14:sldIdLst>
+        </p14:section>
+        <p14:section name="Room Page" id="{93E26BFF-8C5C-2249-BFF9-AC14FC198EDA}">
+          <p14:sldIdLst>
+            <p14:sldId id="265"/>
+            <p14:sldId id="259"/>
+          </p14:sldIdLst>
+        </p14:section>
+        <p14:section name="Entrance Page" id="{B780990A-304E-234D-BF90-456592660905}">
+          <p14:sldIdLst>
+            <p14:sldId id="261"/>
+            <p14:sldId id="262"/>
+            <p14:sldId id="264"/>
+          </p14:sldIdLst>
+        </p14:section>
+      </p14:sectionLst>
+    </p:ext>
     <p:ext uri="{EFAFB233-063F-42B5-8137-9DF3F51BA10A}">
       <p15:sldGuideLst xmlns:p15="http://schemas.microsoft.com/office/powerpoint/2012/main">
         <p15:guide id="1" orient="horz" pos="2047" userDrawn="1">
@@ -211,7 +243,7 @@
           <a:p>
             <a:fld id="{CFACB741-F634-C24E-ACDA-3F21EA7175DC}" type="datetimeFigureOut">
               <a:rPr kumimoji="1" lang="ko-KR" altLang="en-US" smtClean="0"/>
-              <a:t>2019. 5. 21.</a:t>
+              <a:t>2019. 6. 3.</a:t>
             </a:fld>
             <a:endParaRPr kumimoji="1" lang="ko-KR" altLang="en-US"/>
           </a:p>
@@ -763,7 +795,15 @@
           <a:p>
             <a:r>
               <a:rPr kumimoji="1" lang="en-US" altLang="ko-KR" dirty="0"/>
-              <a:t>Room Page</a:t>
+              <a:t>Room Create</a:t>
+            </a:r>
+            <a:r>
+              <a:rPr kumimoji="1" lang="ko-KR" altLang="en-US" dirty="0"/>
+              <a:t> </a:t>
+            </a:r>
+            <a:r>
+              <a:rPr kumimoji="1" lang="en-US" altLang="ko-KR" dirty="0"/>
+              <a:t>Page</a:t>
             </a:r>
             <a:endParaRPr kumimoji="1" lang="ko-KR" altLang="en-US" dirty="0"/>
           </a:p>
@@ -795,7 +835,363 @@
     </p:spTree>
     <p:extLst>
       <p:ext uri="{BB962C8B-B14F-4D97-AF65-F5344CB8AC3E}">
+        <p14:creationId xmlns:p14="http://schemas.microsoft.com/office/powerpoint/2010/main" val="4233698825"/>
+      </p:ext>
+    </p:extLst>
+  </p:cSld>
+  <p:clrMapOvr>
+    <a:masterClrMapping/>
+  </p:clrMapOvr>
+</p:notes>
+</file>
+
+<file path=ppt/notesSlides/notesSlide5.xml><?xml version="1.0" encoding="utf-8"?>
+<p:notes xmlns:a="http://schemas.openxmlformats.org/drawingml/2006/main" xmlns:r="http://schemas.openxmlformats.org/officeDocument/2006/relationships" xmlns:p="http://schemas.openxmlformats.org/presentationml/2006/main">
+  <p:cSld>
+    <p:spTree>
+      <p:nvGrpSpPr>
+        <p:cNvPr id="1" name=""/>
+        <p:cNvGrpSpPr/>
+        <p:nvPr/>
+      </p:nvGrpSpPr>
+      <p:grpSpPr>
+        <a:xfrm>
+          <a:off x="0" y="0"/>
+          <a:ext cx="0" cy="0"/>
+          <a:chOff x="0" y="0"/>
+          <a:chExt cx="0" cy="0"/>
+        </a:xfrm>
+      </p:grpSpPr>
+      <p:sp>
+        <p:nvSpPr>
+          <p:cNvPr id="2" name="슬라이드 이미지 개체 틀 1"/>
+          <p:cNvSpPr>
+            <a:spLocks noGrp="1" noRot="1" noChangeAspect="1"/>
+          </p:cNvSpPr>
+          <p:nvPr>
+            <p:ph type="sldImg"/>
+          </p:nvPr>
+        </p:nvSpPr>
+        <p:spPr/>
+      </p:sp>
+      <p:sp>
+        <p:nvSpPr>
+          <p:cNvPr id="3" name="슬라이드 노트 개체 틀 2"/>
+          <p:cNvSpPr>
+            <a:spLocks noGrp="1"/>
+          </p:cNvSpPr>
+          <p:nvPr>
+            <p:ph type="body" idx="1"/>
+          </p:nvPr>
+        </p:nvSpPr>
+        <p:spPr/>
+        <p:txBody>
+          <a:bodyPr/>
+          <a:lstStyle/>
+          <a:p>
+            <a:r>
+              <a:rPr kumimoji="1" lang="en-US" altLang="ko-KR" dirty="0"/>
+              <a:t>Room Page</a:t>
+            </a:r>
+            <a:endParaRPr kumimoji="1" lang="ko-KR" altLang="en-US" dirty="0"/>
+          </a:p>
+        </p:txBody>
+      </p:sp>
+      <p:sp>
+        <p:nvSpPr>
+          <p:cNvPr id="4" name="슬라이드 번호 개체 틀 3"/>
+          <p:cNvSpPr>
+            <a:spLocks noGrp="1"/>
+          </p:cNvSpPr>
+          <p:nvPr>
+            <p:ph type="sldNum" sz="quarter" idx="5"/>
+          </p:nvPr>
+        </p:nvSpPr>
+        <p:spPr/>
+        <p:txBody>
+          <a:bodyPr/>
+          <a:lstStyle/>
+          <a:p>
+            <a:fld id="{BF3A642A-6642-CD43-931E-A8C786FEBA0D}" type="slidenum">
+              <a:rPr kumimoji="1" lang="ko-KR" altLang="en-US" smtClean="0"/>
+              <a:t>5</a:t>
+            </a:fld>
+            <a:endParaRPr kumimoji="1" lang="ko-KR" altLang="en-US"/>
+          </a:p>
+        </p:txBody>
+      </p:sp>
+    </p:spTree>
+    <p:extLst>
+      <p:ext uri="{BB962C8B-B14F-4D97-AF65-F5344CB8AC3E}">
         <p14:creationId xmlns:p14="http://schemas.microsoft.com/office/powerpoint/2010/main" val="3799409945"/>
+      </p:ext>
+    </p:extLst>
+  </p:cSld>
+  <p:clrMapOvr>
+    <a:masterClrMapping/>
+  </p:clrMapOvr>
+</p:notes>
+</file>
+
+<file path=ppt/notesSlides/notesSlide6.xml><?xml version="1.0" encoding="utf-8"?>
+<p:notes xmlns:a="http://schemas.openxmlformats.org/drawingml/2006/main" xmlns:r="http://schemas.openxmlformats.org/officeDocument/2006/relationships" xmlns:p="http://schemas.openxmlformats.org/presentationml/2006/main">
+  <p:cSld>
+    <p:spTree>
+      <p:nvGrpSpPr>
+        <p:cNvPr id="1" name=""/>
+        <p:cNvGrpSpPr/>
+        <p:nvPr/>
+      </p:nvGrpSpPr>
+      <p:grpSpPr>
+        <a:xfrm>
+          <a:off x="0" y="0"/>
+          <a:ext cx="0" cy="0"/>
+          <a:chOff x="0" y="0"/>
+          <a:chExt cx="0" cy="0"/>
+        </a:xfrm>
+      </p:grpSpPr>
+      <p:sp>
+        <p:nvSpPr>
+          <p:cNvPr id="2" name="슬라이드 이미지 개체 틀 1"/>
+          <p:cNvSpPr>
+            <a:spLocks noGrp="1" noRot="1" noChangeAspect="1"/>
+          </p:cNvSpPr>
+          <p:nvPr>
+            <p:ph type="sldImg"/>
+          </p:nvPr>
+        </p:nvSpPr>
+        <p:spPr/>
+      </p:sp>
+      <p:sp>
+        <p:nvSpPr>
+          <p:cNvPr id="3" name="슬라이드 노트 개체 틀 2"/>
+          <p:cNvSpPr>
+            <a:spLocks noGrp="1"/>
+          </p:cNvSpPr>
+          <p:nvPr>
+            <p:ph type="body" idx="1"/>
+          </p:nvPr>
+        </p:nvSpPr>
+        <p:spPr/>
+        <p:txBody>
+          <a:bodyPr/>
+          <a:lstStyle/>
+          <a:p>
+            <a:r>
+              <a:rPr kumimoji="1" lang="en-US" altLang="ko-KR" dirty="0"/>
+              <a:t>Entrance Page : main</a:t>
+            </a:r>
+            <a:endParaRPr kumimoji="1" lang="ko-KR" altLang="en-US" dirty="0"/>
+          </a:p>
+        </p:txBody>
+      </p:sp>
+      <p:sp>
+        <p:nvSpPr>
+          <p:cNvPr id="4" name="슬라이드 번호 개체 틀 3"/>
+          <p:cNvSpPr>
+            <a:spLocks noGrp="1"/>
+          </p:cNvSpPr>
+          <p:nvPr>
+            <p:ph type="sldNum" sz="quarter" idx="5"/>
+          </p:nvPr>
+        </p:nvSpPr>
+        <p:spPr/>
+        <p:txBody>
+          <a:bodyPr/>
+          <a:lstStyle/>
+          <a:p>
+            <a:fld id="{BF3A642A-6642-CD43-931E-A8C786FEBA0D}" type="slidenum">
+              <a:rPr kumimoji="1" lang="ko-KR" altLang="en-US" smtClean="0"/>
+              <a:t>6</a:t>
+            </a:fld>
+            <a:endParaRPr kumimoji="1" lang="ko-KR" altLang="en-US"/>
+          </a:p>
+        </p:txBody>
+      </p:sp>
+    </p:spTree>
+    <p:extLst>
+      <p:ext uri="{BB962C8B-B14F-4D97-AF65-F5344CB8AC3E}">
+        <p14:creationId xmlns:p14="http://schemas.microsoft.com/office/powerpoint/2010/main" val="242833347"/>
+      </p:ext>
+    </p:extLst>
+  </p:cSld>
+  <p:clrMapOvr>
+    <a:masterClrMapping/>
+  </p:clrMapOvr>
+</p:notes>
+</file>
+
+<file path=ppt/notesSlides/notesSlide7.xml><?xml version="1.0" encoding="utf-8"?>
+<p:notes xmlns:a="http://schemas.openxmlformats.org/drawingml/2006/main" xmlns:r="http://schemas.openxmlformats.org/officeDocument/2006/relationships" xmlns:p="http://schemas.openxmlformats.org/presentationml/2006/main">
+  <p:cSld>
+    <p:spTree>
+      <p:nvGrpSpPr>
+        <p:cNvPr id="1" name=""/>
+        <p:cNvGrpSpPr/>
+        <p:nvPr/>
+      </p:nvGrpSpPr>
+      <p:grpSpPr>
+        <a:xfrm>
+          <a:off x="0" y="0"/>
+          <a:ext cx="0" cy="0"/>
+          <a:chOff x="0" y="0"/>
+          <a:chExt cx="0" cy="0"/>
+        </a:xfrm>
+      </p:grpSpPr>
+      <p:sp>
+        <p:nvSpPr>
+          <p:cNvPr id="2" name="슬라이드 이미지 개체 틀 1"/>
+          <p:cNvSpPr>
+            <a:spLocks noGrp="1" noRot="1" noChangeAspect="1"/>
+          </p:cNvSpPr>
+          <p:nvPr>
+            <p:ph type="sldImg"/>
+          </p:nvPr>
+        </p:nvSpPr>
+        <p:spPr/>
+      </p:sp>
+      <p:sp>
+        <p:nvSpPr>
+          <p:cNvPr id="3" name="슬라이드 노트 개체 틀 2"/>
+          <p:cNvSpPr>
+            <a:spLocks noGrp="1"/>
+          </p:cNvSpPr>
+          <p:nvPr>
+            <p:ph type="body" idx="1"/>
+          </p:nvPr>
+        </p:nvSpPr>
+        <p:spPr/>
+        <p:txBody>
+          <a:bodyPr/>
+          <a:lstStyle/>
+          <a:p>
+            <a:r>
+              <a:rPr kumimoji="1" lang="en-US" altLang="ko-KR" dirty="0"/>
+              <a:t>Entrance Page : signup</a:t>
+            </a:r>
+            <a:endParaRPr kumimoji="1" lang="ko-KR" altLang="en-US" dirty="0"/>
+          </a:p>
+        </p:txBody>
+      </p:sp>
+      <p:sp>
+        <p:nvSpPr>
+          <p:cNvPr id="4" name="슬라이드 번호 개체 틀 3"/>
+          <p:cNvSpPr>
+            <a:spLocks noGrp="1"/>
+          </p:cNvSpPr>
+          <p:nvPr>
+            <p:ph type="sldNum" sz="quarter" idx="5"/>
+          </p:nvPr>
+        </p:nvSpPr>
+        <p:spPr/>
+        <p:txBody>
+          <a:bodyPr/>
+          <a:lstStyle/>
+          <a:p>
+            <a:fld id="{BF3A642A-6642-CD43-931E-A8C786FEBA0D}" type="slidenum">
+              <a:rPr kumimoji="1" lang="ko-KR" altLang="en-US" smtClean="0"/>
+              <a:t>7</a:t>
+            </a:fld>
+            <a:endParaRPr kumimoji="1" lang="ko-KR" altLang="en-US"/>
+          </a:p>
+        </p:txBody>
+      </p:sp>
+    </p:spTree>
+    <p:extLst>
+      <p:ext uri="{BB962C8B-B14F-4D97-AF65-F5344CB8AC3E}">
+        <p14:creationId xmlns:p14="http://schemas.microsoft.com/office/powerpoint/2010/main" val="961999558"/>
+      </p:ext>
+    </p:extLst>
+  </p:cSld>
+  <p:clrMapOvr>
+    <a:masterClrMapping/>
+  </p:clrMapOvr>
+</p:notes>
+</file>
+
+<file path=ppt/notesSlides/notesSlide8.xml><?xml version="1.0" encoding="utf-8"?>
+<p:notes xmlns:a="http://schemas.openxmlformats.org/drawingml/2006/main" xmlns:r="http://schemas.openxmlformats.org/officeDocument/2006/relationships" xmlns:p="http://schemas.openxmlformats.org/presentationml/2006/main">
+  <p:cSld>
+    <p:spTree>
+      <p:nvGrpSpPr>
+        <p:cNvPr id="1" name=""/>
+        <p:cNvGrpSpPr/>
+        <p:nvPr/>
+      </p:nvGrpSpPr>
+      <p:grpSpPr>
+        <a:xfrm>
+          <a:off x="0" y="0"/>
+          <a:ext cx="0" cy="0"/>
+          <a:chOff x="0" y="0"/>
+          <a:chExt cx="0" cy="0"/>
+        </a:xfrm>
+      </p:grpSpPr>
+      <p:sp>
+        <p:nvSpPr>
+          <p:cNvPr id="2" name="슬라이드 이미지 개체 틀 1"/>
+          <p:cNvSpPr>
+            <a:spLocks noGrp="1" noRot="1" noChangeAspect="1"/>
+          </p:cNvSpPr>
+          <p:nvPr>
+            <p:ph type="sldImg"/>
+          </p:nvPr>
+        </p:nvSpPr>
+        <p:spPr/>
+      </p:sp>
+      <p:sp>
+        <p:nvSpPr>
+          <p:cNvPr id="3" name="슬라이드 노트 개체 틀 2"/>
+          <p:cNvSpPr>
+            <a:spLocks noGrp="1"/>
+          </p:cNvSpPr>
+          <p:nvPr>
+            <p:ph type="body" idx="1"/>
+          </p:nvPr>
+        </p:nvSpPr>
+        <p:spPr/>
+        <p:txBody>
+          <a:bodyPr/>
+          <a:lstStyle/>
+          <a:p>
+            <a:r>
+              <a:rPr kumimoji="1" lang="en-US" altLang="ko-KR" dirty="0"/>
+              <a:t>Entrance Page : already </a:t>
+            </a:r>
+            <a:r>
+              <a:rPr kumimoji="1" lang="en-US" altLang="ko-KR" dirty="0" err="1"/>
+              <a:t>signin</a:t>
+            </a:r>
+            <a:endParaRPr kumimoji="1" lang="ko-KR" altLang="en-US" dirty="0"/>
+          </a:p>
+        </p:txBody>
+      </p:sp>
+      <p:sp>
+        <p:nvSpPr>
+          <p:cNvPr id="4" name="슬라이드 번호 개체 틀 3"/>
+          <p:cNvSpPr>
+            <a:spLocks noGrp="1"/>
+          </p:cNvSpPr>
+          <p:nvPr>
+            <p:ph type="sldNum" sz="quarter" idx="5"/>
+          </p:nvPr>
+        </p:nvSpPr>
+        <p:spPr/>
+        <p:txBody>
+          <a:bodyPr/>
+          <a:lstStyle/>
+          <a:p>
+            <a:fld id="{BF3A642A-6642-CD43-931E-A8C786FEBA0D}" type="slidenum">
+              <a:rPr kumimoji="1" lang="ko-KR" altLang="en-US" smtClean="0"/>
+              <a:t>8</a:t>
+            </a:fld>
+            <a:endParaRPr kumimoji="1" lang="ko-KR" altLang="en-US"/>
+          </a:p>
+        </p:txBody>
+      </p:sp>
+    </p:spTree>
+    <p:extLst>
+      <p:ext uri="{BB962C8B-B14F-4D97-AF65-F5344CB8AC3E}">
+        <p14:creationId xmlns:p14="http://schemas.microsoft.com/office/powerpoint/2010/main" val="643733136"/>
       </p:ext>
     </p:extLst>
   </p:cSld>
@@ -952,7 +1348,7 @@
           <a:p>
             <a:fld id="{B8694C9C-6BB6-9342-9726-5E25EC0060D1}" type="datetimeFigureOut">
               <a:rPr kumimoji="1" lang="ko-KR" altLang="en-US" smtClean="0"/>
-              <a:t>2019. 5. 21.</a:t>
+              <a:t>2019. 6. 3.</a:t>
             </a:fld>
             <a:endParaRPr kumimoji="1" lang="ko-KR" altLang="en-US"/>
           </a:p>
@@ -1125,7 +1521,7 @@
           <a:p>
             <a:fld id="{B8694C9C-6BB6-9342-9726-5E25EC0060D1}" type="datetimeFigureOut">
               <a:rPr kumimoji="1" lang="ko-KR" altLang="en-US" smtClean="0"/>
-              <a:t>2019. 5. 21.</a:t>
+              <a:t>2019. 6. 3.</a:t>
             </a:fld>
             <a:endParaRPr kumimoji="1" lang="ko-KR" altLang="en-US"/>
           </a:p>
@@ -1308,7 +1704,7 @@
           <a:p>
             <a:fld id="{B8694C9C-6BB6-9342-9726-5E25EC0060D1}" type="datetimeFigureOut">
               <a:rPr kumimoji="1" lang="ko-KR" altLang="en-US" smtClean="0"/>
-              <a:t>2019. 5. 21.</a:t>
+              <a:t>2019. 6. 3.</a:t>
             </a:fld>
             <a:endParaRPr kumimoji="1" lang="ko-KR" altLang="en-US"/>
           </a:p>
@@ -1481,7 +1877,7 @@
           <a:p>
             <a:fld id="{B8694C9C-6BB6-9342-9726-5E25EC0060D1}" type="datetimeFigureOut">
               <a:rPr kumimoji="1" lang="ko-KR" altLang="en-US" smtClean="0"/>
-              <a:t>2019. 5. 21.</a:t>
+              <a:t>2019. 6. 3.</a:t>
             </a:fld>
             <a:endParaRPr kumimoji="1" lang="ko-KR" altLang="en-US"/>
           </a:p>
@@ -1759,7 +2155,7 @@
           <a:p>
             <a:fld id="{B8694C9C-6BB6-9342-9726-5E25EC0060D1}" type="datetimeFigureOut">
               <a:rPr kumimoji="1" lang="ko-KR" altLang="en-US" smtClean="0"/>
-              <a:t>2019. 5. 21.</a:t>
+              <a:t>2019. 6. 3.</a:t>
             </a:fld>
             <a:endParaRPr kumimoji="1" lang="ko-KR" altLang="en-US"/>
           </a:p>
@@ -1974,7 +2370,7 @@
           <a:p>
             <a:fld id="{B8694C9C-6BB6-9342-9726-5E25EC0060D1}" type="datetimeFigureOut">
               <a:rPr kumimoji="1" lang="ko-KR" altLang="en-US" smtClean="0"/>
-              <a:t>2019. 5. 21.</a:t>
+              <a:t>2019. 6. 3.</a:t>
             </a:fld>
             <a:endParaRPr kumimoji="1" lang="ko-KR" altLang="en-US"/>
           </a:p>
@@ -2342,7 +2738,7 @@
           <a:p>
             <a:fld id="{B8694C9C-6BB6-9342-9726-5E25EC0060D1}" type="datetimeFigureOut">
               <a:rPr kumimoji="1" lang="ko-KR" altLang="en-US" smtClean="0"/>
-              <a:t>2019. 5. 21.</a:t>
+              <a:t>2019. 6. 3.</a:t>
             </a:fld>
             <a:endParaRPr kumimoji="1" lang="ko-KR" altLang="en-US"/>
           </a:p>
@@ -2483,7 +2879,7 @@
           <a:p>
             <a:fld id="{B8694C9C-6BB6-9342-9726-5E25EC0060D1}" type="datetimeFigureOut">
               <a:rPr kumimoji="1" lang="ko-KR" altLang="en-US" smtClean="0"/>
-              <a:t>2019. 5. 21.</a:t>
+              <a:t>2019. 6. 3.</a:t>
             </a:fld>
             <a:endParaRPr kumimoji="1" lang="ko-KR" altLang="en-US"/>
           </a:p>
@@ -2596,7 +2992,7 @@
           <a:p>
             <a:fld id="{B8694C9C-6BB6-9342-9726-5E25EC0060D1}" type="datetimeFigureOut">
               <a:rPr kumimoji="1" lang="ko-KR" altLang="en-US" smtClean="0"/>
-              <a:t>2019. 5. 21.</a:t>
+              <a:t>2019. 6. 3.</a:t>
             </a:fld>
             <a:endParaRPr kumimoji="1" lang="ko-KR" altLang="en-US"/>
           </a:p>
@@ -2885,7 +3281,7 @@
           <a:p>
             <a:fld id="{B8694C9C-6BB6-9342-9726-5E25EC0060D1}" type="datetimeFigureOut">
               <a:rPr kumimoji="1" lang="ko-KR" altLang="en-US" smtClean="0"/>
-              <a:t>2019. 5. 21.</a:t>
+              <a:t>2019. 6. 3.</a:t>
             </a:fld>
             <a:endParaRPr kumimoji="1" lang="ko-KR" altLang="en-US"/>
           </a:p>
@@ -3176,7 +3572,7 @@
           <a:p>
             <a:fld id="{B8694C9C-6BB6-9342-9726-5E25EC0060D1}" type="datetimeFigureOut">
               <a:rPr kumimoji="1" lang="ko-KR" altLang="en-US" smtClean="0"/>
-              <a:t>2019. 5. 21.</a:t>
+              <a:t>2019. 6. 3.</a:t>
             </a:fld>
             <a:endParaRPr kumimoji="1" lang="ko-KR" altLang="en-US"/>
           </a:p>
@@ -3395,7 +3791,7 @@
           <a:p>
             <a:fld id="{B8694C9C-6BB6-9342-9726-5E25EC0060D1}" type="datetimeFigureOut">
               <a:rPr kumimoji="1" lang="ko-KR" altLang="en-US" smtClean="0"/>
-              <a:t>2019. 5. 21.</a:t>
+              <a:t>2019. 6. 3.</a:t>
             </a:fld>
             <a:endParaRPr kumimoji="1" lang="ko-KR" altLang="en-US"/>
           </a:p>
@@ -6224,7 +6620,7 @@
         </p:nvSpPr>
         <p:spPr>
           <a:xfrm>
-            <a:off x="4894025" y="4107568"/>
+            <a:off x="4894025" y="3995135"/>
             <a:ext cx="2403951" cy="1867566"/>
           </a:xfrm>
           <a:prstGeom prst="rect">
@@ -6280,8 +6676,8 @@
         </p:nvSpPr>
         <p:spPr>
           <a:xfrm>
-            <a:off x="4894025" y="3181594"/>
-            <a:ext cx="2403951" cy="842653"/>
+            <a:off x="4894025" y="3010305"/>
+            <a:ext cx="2403951" cy="901509"/>
           </a:xfrm>
           <a:prstGeom prst="rect">
             <a:avLst/>
@@ -6336,7 +6732,7 @@
         </p:nvSpPr>
         <p:spPr>
           <a:xfrm>
-            <a:off x="5171838" y="3608719"/>
+            <a:off x="5171838" y="3531215"/>
             <a:ext cx="1848323" cy="234616"/>
           </a:xfrm>
           <a:prstGeom prst="roundRect">
@@ -6385,70 +6781,8 @@
                   <a:schemeClr val="bg1"/>
                 </a:solidFill>
               </a:rPr>
-              <a:t>내역 추가</a:t>
-            </a:r>
-          </a:p>
-        </p:txBody>
-      </p:sp>
-      <p:sp>
-        <p:nvSpPr>
-          <p:cNvPr id="24" name="TextBox 23">
-            <a:extLst>
-              <a:ext uri="{FF2B5EF4-FFF2-40B4-BE49-F238E27FC236}">
-                <a16:creationId xmlns:a16="http://schemas.microsoft.com/office/drawing/2014/main" id="{A10A7A5C-B1F8-864F-8E88-3E5791A48547}"/>
-              </a:ext>
-            </a:extLst>
-          </p:cNvPr>
-          <p:cNvSpPr txBox="1"/>
-          <p:nvPr/>
-        </p:nvSpPr>
-        <p:spPr>
-          <a:xfrm>
-            <a:off x="5295014" y="3337726"/>
-            <a:ext cx="1616148" cy="246221"/>
-          </a:xfrm>
-          <a:prstGeom prst="rect">
-            <a:avLst/>
-          </a:prstGeom>
-          <a:noFill/>
-        </p:spPr>
-        <p:txBody>
-          <a:bodyPr wrap="none" rtlCol="0">
-            <a:spAutoFit/>
-          </a:bodyPr>
-          <a:lstStyle/>
-          <a:p>
-            <a:pPr algn="ctr"/>
-            <a:r>
-              <a:rPr kumimoji="1" lang="ko-KR" altLang="en-US" sz="1000" dirty="0">
-                <a:solidFill>
-                  <a:schemeClr val="tx1">
-                    <a:lumMod val="65000"/>
-                    <a:lumOff val="35000"/>
-                  </a:schemeClr>
-                </a:solidFill>
-              </a:rPr>
-              <a:t>새로운 계산이 생겼다면</a:t>
-            </a:r>
-            <a:r>
-              <a:rPr kumimoji="1" lang="en-US" altLang="ko-KR" sz="1000" dirty="0">
-                <a:solidFill>
-                  <a:schemeClr val="tx1">
-                    <a:lumMod val="65000"/>
-                    <a:lumOff val="35000"/>
-                  </a:schemeClr>
-                </a:solidFill>
-              </a:rPr>
-              <a:t>?</a:t>
-            </a:r>
-            <a:endParaRPr kumimoji="1" lang="ko-KR" altLang="en-US" sz="1000" dirty="0">
-              <a:solidFill>
-                <a:schemeClr val="tx1">
-                  <a:lumMod val="65000"/>
-                  <a:lumOff val="35000"/>
-                </a:schemeClr>
-              </a:solidFill>
-            </a:endParaRPr>
+              <a:t>멤버 추가</a:t>
+            </a:r>
           </a:p>
         </p:txBody>
       </p:sp>
@@ -6466,7 +6800,7 @@
         </p:nvSpPr>
         <p:spPr>
           <a:xfrm>
-            <a:off x="5079422" y="5062733"/>
+            <a:off x="5079422" y="4950300"/>
             <a:ext cx="2033155" cy="484040"/>
           </a:xfrm>
           <a:prstGeom prst="roundRect">
@@ -6510,34 +6844,28 @@
           </a:bodyPr>
           <a:lstStyle/>
           <a:p>
+            <a:pPr lvl="0"/>
+            <a:r>
+              <a:rPr kumimoji="1" lang="en-US" altLang="ko-KR" sz="1100" b="1" dirty="0">
+                <a:solidFill>
+                  <a:prstClr val="black">
+                    <a:lumMod val="75000"/>
+                    <a:lumOff val="25000"/>
+                  </a:prstClr>
+                </a:solidFill>
+              </a:rPr>
+              <a:t>2.</a:t>
+            </a:r>
             <a:r>
               <a:rPr kumimoji="1" lang="ko-KR" altLang="en-US" sz="1100" b="1" dirty="0">
                 <a:solidFill>
-                  <a:schemeClr val="tx1">
+                  <a:prstClr val="black">
                     <a:lumMod val="75000"/>
                     <a:lumOff val="25000"/>
-                  </a:schemeClr>
+                  </a:prstClr>
                 </a:solidFill>
               </a:rPr>
-              <a:t>노래방</a:t>
-            </a:r>
-            <a:r>
-              <a:rPr kumimoji="1" lang="ko-KR" altLang="en-US" sz="1100" b="1" dirty="0">
-                <a:solidFill>
-                  <a:schemeClr val="bg1">
-                    <a:lumMod val="50000"/>
-                  </a:schemeClr>
-                </a:solidFill>
-              </a:rPr>
-              <a:t>  </a:t>
-            </a:r>
-            <a:r>
-              <a:rPr kumimoji="1" lang="ko-KR" altLang="en-US" sz="1100" b="1" dirty="0">
-                <a:solidFill>
-                  <a:srgbClr val="00B0F0"/>
-                </a:solidFill>
-              </a:rPr>
-              <a:t>홍진영</a:t>
+              <a:t> 홍진영</a:t>
             </a:r>
             <a:endParaRPr kumimoji="1" lang="en-US" altLang="ko-KR" sz="1100" b="1" dirty="0">
               <a:solidFill>
@@ -6546,26 +6874,14 @@
             </a:endParaRPr>
           </a:p>
           <a:p>
-            <a:pPr algn="r"/>
-            <a:r>
-              <a:rPr kumimoji="1" lang="en-US" altLang="ko-KR" sz="1000" dirty="0">
+            <a:pPr lvl="0" algn="r"/>
+            <a:r>
+              <a:rPr kumimoji="1" lang="ko-KR" altLang="en-US" sz="1000" b="1" dirty="0">
                 <a:solidFill>
-                  <a:schemeClr val="bg1">
-                    <a:lumMod val="50000"/>
-                  </a:schemeClr>
+                  <a:srgbClr val="FF0000"/>
                 </a:solidFill>
               </a:rPr>
-              <a:t>25,000</a:t>
-            </a:r>
-            <a:r>
-              <a:rPr kumimoji="1" lang="ko-KR" altLang="en-US" sz="1000" dirty="0">
-                <a:solidFill>
-                  <a:schemeClr val="bg1">
-                    <a:lumMod val="50000"/>
-                  </a:schemeClr>
-                </a:solidFill>
-              </a:rPr>
-              <a:t>원</a:t>
+              <a:t>삭제</a:t>
             </a:r>
           </a:p>
         </p:txBody>
@@ -6584,7 +6900,7 @@
         </p:nvSpPr>
         <p:spPr>
           <a:xfrm>
-            <a:off x="5079422" y="5648334"/>
+            <a:off x="5079422" y="5535901"/>
             <a:ext cx="2033155" cy="484040"/>
           </a:xfrm>
           <a:prstGeom prst="roundRect">
@@ -6628,23 +6944,25 @@
           </a:bodyPr>
           <a:lstStyle/>
           <a:p>
+            <a:pPr lvl="0"/>
+            <a:r>
+              <a:rPr kumimoji="1" lang="en-US" altLang="ko-KR" sz="1100" b="1" dirty="0">
+                <a:solidFill>
+                  <a:prstClr val="black">
+                    <a:lumMod val="75000"/>
+                    <a:lumOff val="25000"/>
+                  </a:prstClr>
+                </a:solidFill>
+              </a:rPr>
+              <a:t>3.</a:t>
+            </a:r>
             <a:r>
               <a:rPr kumimoji="1" lang="ko-KR" altLang="en-US" sz="1100" b="1" dirty="0">
                 <a:solidFill>
-                  <a:schemeClr val="tx1">
+                  <a:prstClr val="black">
                     <a:lumMod val="75000"/>
                     <a:lumOff val="25000"/>
-                  </a:schemeClr>
-                </a:solidFill>
-              </a:rPr>
-              <a:t>카페 </a:t>
-            </a:r>
-            <a:r>
-              <a:rPr kumimoji="1" lang="ko-KR" altLang="en-US" sz="1100" b="1" dirty="0">
-                <a:solidFill>
-                  <a:schemeClr val="bg1">
-                    <a:lumMod val="50000"/>
-                  </a:schemeClr>
+                  </a:prstClr>
                 </a:solidFill>
               </a:rPr>
               <a:t> </a:t>
@@ -6652,10 +6970,13 @@
             <a:r>
               <a:rPr kumimoji="1" lang="ko-KR" altLang="en-US" sz="1100" b="1" dirty="0" err="1">
                 <a:solidFill>
-                  <a:srgbClr val="00B0F0"/>
+                  <a:prstClr val="black">
+                    <a:lumMod val="75000"/>
+                    <a:lumOff val="25000"/>
+                  </a:prstClr>
                 </a:solidFill>
               </a:rPr>
-              <a:t>홍록기</a:t>
+              <a:t>홍데니스</a:t>
             </a:r>
             <a:endParaRPr kumimoji="1" lang="en-US" altLang="ko-KR" sz="1100" b="1" dirty="0">
               <a:solidFill>
@@ -6664,26 +6985,14 @@
             </a:endParaRPr>
           </a:p>
           <a:p>
-            <a:pPr algn="r"/>
-            <a:r>
-              <a:rPr kumimoji="1" lang="en-US" altLang="ko-KR" sz="1000" dirty="0">
+            <a:pPr lvl="0" algn="r"/>
+            <a:r>
+              <a:rPr kumimoji="1" lang="ko-KR" altLang="en-US" sz="1000" b="1" dirty="0">
                 <a:solidFill>
-                  <a:schemeClr val="bg1">
-                    <a:lumMod val="50000"/>
-                  </a:schemeClr>
+                  <a:srgbClr val="FF0000"/>
                 </a:solidFill>
               </a:rPr>
-              <a:t>30,000</a:t>
-            </a:r>
-            <a:r>
-              <a:rPr kumimoji="1" lang="ko-KR" altLang="en-US" sz="1000" dirty="0">
-                <a:solidFill>
-                  <a:schemeClr val="bg1">
-                    <a:lumMod val="50000"/>
-                  </a:schemeClr>
-                </a:solidFill>
-              </a:rPr>
-              <a:t>원 </a:t>
+              <a:t>삭제</a:t>
             </a:r>
           </a:p>
         </p:txBody>
@@ -6702,7 +7011,7 @@
         </p:nvSpPr>
         <p:spPr>
           <a:xfrm>
-            <a:off x="4901105" y="5974221"/>
+            <a:off x="4901105" y="5861788"/>
             <a:ext cx="2403951" cy="253636"/>
           </a:xfrm>
           <a:prstGeom prst="rect">
@@ -6754,7 +7063,7 @@
         </p:nvCxnSpPr>
         <p:spPr>
           <a:xfrm>
-            <a:off x="4901105" y="5981148"/>
+            <a:off x="4901105" y="5868715"/>
             <a:ext cx="2403951" cy="0"/>
           </a:xfrm>
           <a:prstGeom prst="line">
@@ -6797,7 +7106,7 @@
         </p:nvSpPr>
         <p:spPr>
           <a:xfrm>
-            <a:off x="5079422" y="4480886"/>
+            <a:off x="5079422" y="4368453"/>
             <a:ext cx="2033155" cy="484040"/>
           </a:xfrm>
           <a:prstGeom prst="roundRect">
@@ -6842,6 +7151,1309 @@
           <a:lstStyle/>
           <a:p>
             <a:r>
+              <a:rPr kumimoji="1" lang="en-US" altLang="ko-KR" sz="1100" b="1" dirty="0">
+                <a:solidFill>
+                  <a:schemeClr val="tx1">
+                    <a:lumMod val="75000"/>
+                    <a:lumOff val="25000"/>
+                  </a:schemeClr>
+                </a:solidFill>
+              </a:rPr>
+              <a:t>1.</a:t>
+            </a:r>
+            <a:r>
+              <a:rPr kumimoji="1" lang="ko-KR" altLang="en-US" sz="1100" b="1" dirty="0">
+                <a:solidFill>
+                  <a:schemeClr val="tx1">
+                    <a:lumMod val="75000"/>
+                    <a:lumOff val="25000"/>
+                  </a:schemeClr>
+                </a:solidFill>
+              </a:rPr>
+              <a:t> </a:t>
+            </a:r>
+            <a:r>
+              <a:rPr kumimoji="1" lang="ko-KR" altLang="en-US" sz="1100" b="1" dirty="0" err="1">
+                <a:solidFill>
+                  <a:schemeClr val="tx1">
+                    <a:lumMod val="75000"/>
+                    <a:lumOff val="25000"/>
+                  </a:schemeClr>
+                </a:solidFill>
+              </a:rPr>
+              <a:t>홍인형</a:t>
+            </a:r>
+            <a:endParaRPr kumimoji="1" lang="en-US" altLang="ko-KR" sz="1100" b="1" dirty="0">
+              <a:solidFill>
+                <a:srgbClr val="00B0F0"/>
+              </a:solidFill>
+            </a:endParaRPr>
+          </a:p>
+          <a:p>
+            <a:pPr algn="r"/>
+            <a:r>
+              <a:rPr kumimoji="1" lang="ko-KR" altLang="en-US" sz="1000" b="1" dirty="0">
+                <a:solidFill>
+                  <a:srgbClr val="FF0000"/>
+                </a:solidFill>
+              </a:rPr>
+              <a:t>삭제</a:t>
+            </a:r>
+          </a:p>
+        </p:txBody>
+      </p:sp>
+      <p:sp>
+        <p:nvSpPr>
+          <p:cNvPr id="29" name="TextBox 28">
+            <a:extLst>
+              <a:ext uri="{FF2B5EF4-FFF2-40B4-BE49-F238E27FC236}">
+                <a16:creationId xmlns:a16="http://schemas.microsoft.com/office/drawing/2014/main" id="{ADA8295D-F93C-3047-AEE6-7A0499D3324A}"/>
+              </a:ext>
+            </a:extLst>
+          </p:cNvPr>
+          <p:cNvSpPr txBox="1"/>
+          <p:nvPr/>
+        </p:nvSpPr>
+        <p:spPr>
+          <a:xfrm>
+            <a:off x="4982903" y="4054836"/>
+            <a:ext cx="771365" cy="253916"/>
+          </a:xfrm>
+          <a:prstGeom prst="rect">
+            <a:avLst/>
+          </a:prstGeom>
+          <a:noFill/>
+        </p:spPr>
+        <p:txBody>
+          <a:bodyPr wrap="none" rtlCol="0">
+            <a:spAutoFit/>
+          </a:bodyPr>
+          <a:lstStyle/>
+          <a:p>
+            <a:r>
+              <a:rPr kumimoji="1" lang="ko-KR" altLang="en-US" sz="1050" dirty="0">
+                <a:solidFill>
+                  <a:schemeClr val="tx1">
+                    <a:lumMod val="75000"/>
+                    <a:lumOff val="25000"/>
+                  </a:schemeClr>
+                </a:solidFill>
+              </a:rPr>
+              <a:t>멤버 목록</a:t>
+            </a:r>
+            <a:endParaRPr kumimoji="1" lang="en-US" altLang="ko-KR" sz="1050" dirty="0">
+              <a:solidFill>
+                <a:schemeClr val="tx1">
+                  <a:lumMod val="75000"/>
+                  <a:lumOff val="25000"/>
+                </a:schemeClr>
+              </a:solidFill>
+            </a:endParaRPr>
+          </a:p>
+        </p:txBody>
+      </p:sp>
+      <p:sp>
+        <p:nvSpPr>
+          <p:cNvPr id="34" name="직사각형 33">
+            <a:extLst>
+              <a:ext uri="{FF2B5EF4-FFF2-40B4-BE49-F238E27FC236}">
+                <a16:creationId xmlns:a16="http://schemas.microsoft.com/office/drawing/2014/main" id="{85AE415A-F52E-6849-89F6-B7DF9B5D0D2D}"/>
+              </a:ext>
+            </a:extLst>
+          </p:cNvPr>
+          <p:cNvSpPr/>
+          <p:nvPr/>
+        </p:nvSpPr>
+        <p:spPr>
+          <a:xfrm>
+            <a:off x="4894025" y="1276420"/>
+            <a:ext cx="2403951" cy="1674184"/>
+          </a:xfrm>
+          <a:prstGeom prst="rect">
+            <a:avLst/>
+          </a:prstGeom>
+          <a:solidFill>
+            <a:schemeClr val="bg1"/>
+          </a:solidFill>
+          <a:ln>
+            <a:solidFill>
+              <a:schemeClr val="bg1">
+                <a:lumMod val="75000"/>
+              </a:schemeClr>
+            </a:solidFill>
+          </a:ln>
+        </p:spPr>
+        <p:style>
+          <a:lnRef idx="2">
+            <a:schemeClr val="accent1">
+              <a:shade val="50000"/>
+            </a:schemeClr>
+          </a:lnRef>
+          <a:fillRef idx="1">
+            <a:schemeClr val="accent1"/>
+          </a:fillRef>
+          <a:effectRef idx="0">
+            <a:schemeClr val="accent1"/>
+          </a:effectRef>
+          <a:fontRef idx="minor">
+            <a:schemeClr val="lt1"/>
+          </a:fontRef>
+        </p:style>
+        <p:txBody>
+          <a:bodyPr rtlCol="0" anchor="ctr"/>
+          <a:lstStyle/>
+          <a:p>
+            <a:pPr algn="ctr"/>
+            <a:endParaRPr kumimoji="1" lang="ko-KR" altLang="en-US" dirty="0"/>
+          </a:p>
+        </p:txBody>
+      </p:sp>
+      <p:sp>
+        <p:nvSpPr>
+          <p:cNvPr id="35" name="모서리가 둥근 직사각형 34">
+            <a:extLst>
+              <a:ext uri="{FF2B5EF4-FFF2-40B4-BE49-F238E27FC236}">
+                <a16:creationId xmlns:a16="http://schemas.microsoft.com/office/drawing/2014/main" id="{A4971372-9237-B048-B2E9-0A06977A32A0}"/>
+              </a:ext>
+            </a:extLst>
+          </p:cNvPr>
+          <p:cNvSpPr/>
+          <p:nvPr/>
+        </p:nvSpPr>
+        <p:spPr>
+          <a:xfrm>
+            <a:off x="5171838" y="2506380"/>
+            <a:ext cx="1848323" cy="234616"/>
+          </a:xfrm>
+          <a:prstGeom prst="roundRect">
+            <a:avLst>
+              <a:gd name="adj" fmla="val 12230"/>
+            </a:avLst>
+          </a:prstGeom>
+          <a:solidFill>
+            <a:srgbClr val="00A5FA"/>
+          </a:solidFill>
+          <a:ln>
+            <a:solidFill>
+              <a:srgbClr val="00B0F0"/>
+            </a:solidFill>
+          </a:ln>
+        </p:spPr>
+        <p:style>
+          <a:lnRef idx="2">
+            <a:schemeClr val="accent1">
+              <a:shade val="50000"/>
+            </a:schemeClr>
+          </a:lnRef>
+          <a:fillRef idx="1">
+            <a:schemeClr val="accent1"/>
+          </a:fillRef>
+          <a:effectRef idx="0">
+            <a:schemeClr val="accent1"/>
+          </a:effectRef>
+          <a:fontRef idx="minor">
+            <a:schemeClr val="lt1"/>
+          </a:fontRef>
+        </p:style>
+        <p:txBody>
+          <a:bodyPr rot="0" spcFirstLastPara="0" vertOverflow="overflow" horzOverflow="overflow" vert="horz" wrap="square" lIns="91440" tIns="45720" rIns="91440" bIns="45720" numCol="1" spcCol="0" rtlCol="0" fromWordArt="0" anchor="ctr" anchorCtr="0" forceAA="0" compatLnSpc="1">
+            <a:prstTxWarp prst="textNoShape">
+              <a:avLst/>
+            </a:prstTxWarp>
+            <a:noAutofit/>
+          </a:bodyPr>
+          <a:lstStyle/>
+          <a:p>
+            <a:pPr algn="ctr"/>
+            <a:r>
+              <a:rPr kumimoji="1" lang="ko-KR" altLang="en-US" sz="1000" dirty="0">
+                <a:solidFill>
+                  <a:schemeClr val="bg1"/>
+                </a:solidFill>
+              </a:rPr>
+              <a:t>생성</a:t>
+            </a:r>
+            <a:r>
+              <a:rPr kumimoji="1" lang="en-US" altLang="ko-KR" sz="1000" dirty="0">
+                <a:solidFill>
+                  <a:schemeClr val="bg1"/>
+                </a:solidFill>
+              </a:rPr>
+              <a:t>!</a:t>
+            </a:r>
+            <a:endParaRPr kumimoji="1" lang="ko-KR" altLang="en-US" sz="1000" dirty="0">
+              <a:solidFill>
+                <a:schemeClr val="bg1"/>
+              </a:solidFill>
+            </a:endParaRPr>
+          </a:p>
+        </p:txBody>
+      </p:sp>
+      <p:sp>
+        <p:nvSpPr>
+          <p:cNvPr id="37" name="TextBox 36">
+            <a:extLst>
+              <a:ext uri="{FF2B5EF4-FFF2-40B4-BE49-F238E27FC236}">
+                <a16:creationId xmlns:a16="http://schemas.microsoft.com/office/drawing/2014/main" id="{985B151C-01C4-014A-B006-E8E125897B00}"/>
+              </a:ext>
+            </a:extLst>
+          </p:cNvPr>
+          <p:cNvSpPr txBox="1"/>
+          <p:nvPr/>
+        </p:nvSpPr>
+        <p:spPr>
+          <a:xfrm>
+            <a:off x="5342435" y="1975906"/>
+            <a:ext cx="1507144" cy="338554"/>
+          </a:xfrm>
+          <a:prstGeom prst="rect">
+            <a:avLst/>
+          </a:prstGeom>
+          <a:noFill/>
+        </p:spPr>
+        <p:txBody>
+          <a:bodyPr wrap="none" rtlCol="0">
+            <a:spAutoFit/>
+          </a:bodyPr>
+          <a:lstStyle/>
+          <a:p>
+            <a:pPr algn="ctr"/>
+            <a:r>
+              <a:rPr kumimoji="1" lang="en-US" altLang="ko-KR" sz="1600" b="1" dirty="0"/>
+              <a:t>_______________</a:t>
+            </a:r>
+            <a:endParaRPr kumimoji="1" lang="ko-KR" altLang="en-US" sz="1600" b="1" dirty="0"/>
+          </a:p>
+        </p:txBody>
+      </p:sp>
+      <p:sp>
+        <p:nvSpPr>
+          <p:cNvPr id="40" name="TextBox 39">
+            <a:extLst>
+              <a:ext uri="{FF2B5EF4-FFF2-40B4-BE49-F238E27FC236}">
+                <a16:creationId xmlns:a16="http://schemas.microsoft.com/office/drawing/2014/main" id="{FF2CD8B2-D563-3246-A9AF-E3C8601CB67D}"/>
+              </a:ext>
+            </a:extLst>
+          </p:cNvPr>
+          <p:cNvSpPr txBox="1"/>
+          <p:nvPr/>
+        </p:nvSpPr>
+        <p:spPr>
+          <a:xfrm>
+            <a:off x="5659825" y="1439220"/>
+            <a:ext cx="872355" cy="338554"/>
+          </a:xfrm>
+          <a:prstGeom prst="rect">
+            <a:avLst/>
+          </a:prstGeom>
+          <a:noFill/>
+        </p:spPr>
+        <p:txBody>
+          <a:bodyPr wrap="none" rtlCol="0">
+            <a:spAutoFit/>
+          </a:bodyPr>
+          <a:lstStyle/>
+          <a:p>
+            <a:pPr algn="ctr"/>
+            <a:r>
+              <a:rPr kumimoji="1" lang="ko-KR" altLang="en-US" sz="1600" b="1" dirty="0">
+                <a:solidFill>
+                  <a:srgbClr val="00A5FA"/>
+                </a:solidFill>
+              </a:rPr>
+              <a:t>방 생성</a:t>
+            </a:r>
+          </a:p>
+        </p:txBody>
+      </p:sp>
+      <p:sp>
+        <p:nvSpPr>
+          <p:cNvPr id="2" name="TextBox 1">
+            <a:extLst>
+              <a:ext uri="{FF2B5EF4-FFF2-40B4-BE49-F238E27FC236}">
+                <a16:creationId xmlns:a16="http://schemas.microsoft.com/office/drawing/2014/main" id="{342D94B4-3572-1345-95DA-6137D8C8DE3B}"/>
+              </a:ext>
+            </a:extLst>
+          </p:cNvPr>
+          <p:cNvSpPr txBox="1"/>
+          <p:nvPr/>
+        </p:nvSpPr>
+        <p:spPr>
+          <a:xfrm>
+            <a:off x="5571524" y="1958240"/>
+            <a:ext cx="1063112" cy="276999"/>
+          </a:xfrm>
+          <a:prstGeom prst="rect">
+            <a:avLst/>
+          </a:prstGeom>
+          <a:noFill/>
+        </p:spPr>
+        <p:txBody>
+          <a:bodyPr wrap="none" rtlCol="0">
+            <a:spAutoFit/>
+          </a:bodyPr>
+          <a:lstStyle/>
+          <a:p>
+            <a:pPr algn="ctr"/>
+            <a:r>
+              <a:rPr kumimoji="1" lang="en-US" altLang="ko-KR" sz="1200" dirty="0">
+                <a:solidFill>
+                  <a:schemeClr val="bg1">
+                    <a:lumMod val="75000"/>
+                  </a:schemeClr>
+                </a:solidFill>
+              </a:rPr>
+              <a:t>Room Name</a:t>
+            </a:r>
+            <a:endParaRPr kumimoji="1" lang="ko-KR" altLang="en-US" sz="1200" dirty="0">
+              <a:solidFill>
+                <a:schemeClr val="bg1">
+                  <a:lumMod val="75000"/>
+                </a:schemeClr>
+              </a:solidFill>
+            </a:endParaRPr>
+          </a:p>
+        </p:txBody>
+      </p:sp>
+      <p:sp>
+        <p:nvSpPr>
+          <p:cNvPr id="30" name="TextBox 29">
+            <a:extLst>
+              <a:ext uri="{FF2B5EF4-FFF2-40B4-BE49-F238E27FC236}">
+                <a16:creationId xmlns:a16="http://schemas.microsoft.com/office/drawing/2014/main" id="{7EA72A3F-E96E-304A-A796-093F9BD31F91}"/>
+              </a:ext>
+            </a:extLst>
+          </p:cNvPr>
+          <p:cNvSpPr txBox="1"/>
+          <p:nvPr/>
+        </p:nvSpPr>
+        <p:spPr>
+          <a:xfrm>
+            <a:off x="5342435" y="3151001"/>
+            <a:ext cx="1507144" cy="338554"/>
+          </a:xfrm>
+          <a:prstGeom prst="rect">
+            <a:avLst/>
+          </a:prstGeom>
+          <a:noFill/>
+        </p:spPr>
+        <p:txBody>
+          <a:bodyPr wrap="none" rtlCol="0">
+            <a:spAutoFit/>
+          </a:bodyPr>
+          <a:lstStyle/>
+          <a:p>
+            <a:pPr algn="ctr"/>
+            <a:r>
+              <a:rPr kumimoji="1" lang="en-US" altLang="ko-KR" sz="1600" b="1" dirty="0"/>
+              <a:t>_______________</a:t>
+            </a:r>
+            <a:endParaRPr kumimoji="1" lang="ko-KR" altLang="en-US" sz="1600" b="1" dirty="0"/>
+          </a:p>
+        </p:txBody>
+      </p:sp>
+      <p:sp>
+        <p:nvSpPr>
+          <p:cNvPr id="31" name="TextBox 30">
+            <a:extLst>
+              <a:ext uri="{FF2B5EF4-FFF2-40B4-BE49-F238E27FC236}">
+                <a16:creationId xmlns:a16="http://schemas.microsoft.com/office/drawing/2014/main" id="{5D2E1DD5-0404-C645-B052-08F3ACE0FF8C}"/>
+              </a:ext>
+            </a:extLst>
+          </p:cNvPr>
+          <p:cNvSpPr txBox="1"/>
+          <p:nvPr/>
+        </p:nvSpPr>
+        <p:spPr>
+          <a:xfrm>
+            <a:off x="5481493" y="3123270"/>
+            <a:ext cx="1239442" cy="276999"/>
+          </a:xfrm>
+          <a:prstGeom prst="rect">
+            <a:avLst/>
+          </a:prstGeom>
+          <a:noFill/>
+        </p:spPr>
+        <p:txBody>
+          <a:bodyPr wrap="none" rtlCol="0">
+            <a:spAutoFit/>
+          </a:bodyPr>
+          <a:lstStyle/>
+          <a:p>
+            <a:pPr algn="ctr"/>
+            <a:r>
+              <a:rPr kumimoji="1" lang="en-US" altLang="ko-KR" sz="1200" dirty="0">
+                <a:solidFill>
+                  <a:schemeClr val="bg1">
+                    <a:lumMod val="75000"/>
+                  </a:schemeClr>
+                </a:solidFill>
+              </a:rPr>
+              <a:t>Member Name</a:t>
+            </a:r>
+            <a:endParaRPr kumimoji="1" lang="ko-KR" altLang="en-US" sz="1200" dirty="0">
+              <a:solidFill>
+                <a:schemeClr val="bg1">
+                  <a:lumMod val="75000"/>
+                </a:schemeClr>
+              </a:solidFill>
+            </a:endParaRPr>
+          </a:p>
+        </p:txBody>
+      </p:sp>
+    </p:spTree>
+    <p:extLst>
+      <p:ext uri="{BB962C8B-B14F-4D97-AF65-F5344CB8AC3E}">
+        <p14:creationId xmlns:p14="http://schemas.microsoft.com/office/powerpoint/2010/main" val="2282857764"/>
+      </p:ext>
+    </p:extLst>
+  </p:cSld>
+  <p:clrMapOvr>
+    <a:masterClrMapping/>
+  </p:clrMapOvr>
+</p:sld>
+</file>
+
+<file path=ppt/slides/slide5.xml><?xml version="1.0" encoding="utf-8"?>
+<p:sld xmlns:a="http://schemas.openxmlformats.org/drawingml/2006/main" xmlns:r="http://schemas.openxmlformats.org/officeDocument/2006/relationships" xmlns:p="http://schemas.openxmlformats.org/presentationml/2006/main">
+  <p:cSld>
+    <p:spTree>
+      <p:nvGrpSpPr>
+        <p:cNvPr id="1" name=""/>
+        <p:cNvGrpSpPr/>
+        <p:nvPr/>
+      </p:nvGrpSpPr>
+      <p:grpSpPr>
+        <a:xfrm>
+          <a:off x="0" y="0"/>
+          <a:ext cx="0" cy="0"/>
+          <a:chOff x="0" y="0"/>
+          <a:chExt cx="0" cy="0"/>
+        </a:xfrm>
+      </p:grpSpPr>
+      <p:sp>
+        <p:nvSpPr>
+          <p:cNvPr id="13" name="직사각형 12">
+            <a:extLst>
+              <a:ext uri="{FF2B5EF4-FFF2-40B4-BE49-F238E27FC236}">
+                <a16:creationId xmlns:a16="http://schemas.microsoft.com/office/drawing/2014/main" id="{1A09CB1E-61C8-BF41-8166-783D974FF436}"/>
+              </a:ext>
+            </a:extLst>
+          </p:cNvPr>
+          <p:cNvSpPr/>
+          <p:nvPr/>
+        </p:nvSpPr>
+        <p:spPr>
+          <a:xfrm>
+            <a:off x="0" y="0"/>
+            <a:ext cx="12192000" cy="563417"/>
+          </a:xfrm>
+          <a:prstGeom prst="rect">
+            <a:avLst/>
+          </a:prstGeom>
+          <a:solidFill>
+            <a:schemeClr val="bg1"/>
+          </a:solidFill>
+          <a:ln>
+            <a:solidFill>
+              <a:schemeClr val="bg1">
+                <a:lumMod val="75000"/>
+              </a:schemeClr>
+            </a:solidFill>
+          </a:ln>
+        </p:spPr>
+        <p:style>
+          <a:lnRef idx="2">
+            <a:schemeClr val="accent1">
+              <a:shade val="50000"/>
+            </a:schemeClr>
+          </a:lnRef>
+          <a:fillRef idx="1">
+            <a:schemeClr val="accent1"/>
+          </a:fillRef>
+          <a:effectRef idx="0">
+            <a:schemeClr val="accent1"/>
+          </a:effectRef>
+          <a:fontRef idx="minor">
+            <a:schemeClr val="lt1"/>
+          </a:fontRef>
+        </p:style>
+        <p:txBody>
+          <a:bodyPr rtlCol="0" anchor="ctr"/>
+          <a:lstStyle/>
+          <a:p>
+            <a:pPr algn="ctr"/>
+            <a:endParaRPr kumimoji="1" lang="ko-KR" altLang="en-US" dirty="0"/>
+          </a:p>
+        </p:txBody>
+      </p:sp>
+      <p:sp>
+        <p:nvSpPr>
+          <p:cNvPr id="14" name="TextBox 13">
+            <a:extLst>
+              <a:ext uri="{FF2B5EF4-FFF2-40B4-BE49-F238E27FC236}">
+                <a16:creationId xmlns:a16="http://schemas.microsoft.com/office/drawing/2014/main" id="{D92B28E7-D15C-C445-8715-5E7C0DEAE706}"/>
+              </a:ext>
+            </a:extLst>
+          </p:cNvPr>
+          <p:cNvSpPr txBox="1"/>
+          <p:nvPr/>
+        </p:nvSpPr>
+        <p:spPr>
+          <a:xfrm>
+            <a:off x="5093702" y="112431"/>
+            <a:ext cx="2018759" cy="338554"/>
+          </a:xfrm>
+          <a:prstGeom prst="rect">
+            <a:avLst/>
+          </a:prstGeom>
+          <a:noFill/>
+        </p:spPr>
+        <p:txBody>
+          <a:bodyPr wrap="none" rtlCol="0">
+            <a:spAutoFit/>
+          </a:bodyPr>
+          <a:lstStyle/>
+          <a:p>
+            <a:pPr algn="ctr"/>
+            <a:r>
+              <a:rPr kumimoji="1" lang="en-US" altLang="ko-KR" sz="1600" b="1" dirty="0"/>
+              <a:t>Dutch Broom Stick</a:t>
+            </a:r>
+            <a:endParaRPr kumimoji="1" lang="ko-KR" altLang="en-US" sz="1600" b="1" dirty="0"/>
+          </a:p>
+        </p:txBody>
+      </p:sp>
+      <p:sp>
+        <p:nvSpPr>
+          <p:cNvPr id="15" name="TextBox 14">
+            <a:extLst>
+              <a:ext uri="{FF2B5EF4-FFF2-40B4-BE49-F238E27FC236}">
+                <a16:creationId xmlns:a16="http://schemas.microsoft.com/office/drawing/2014/main" id="{001529B2-C00D-4D4F-BEB9-70140837CDB4}"/>
+              </a:ext>
+            </a:extLst>
+          </p:cNvPr>
+          <p:cNvSpPr txBox="1"/>
+          <p:nvPr/>
+        </p:nvSpPr>
+        <p:spPr>
+          <a:xfrm>
+            <a:off x="5754268" y="6227856"/>
+            <a:ext cx="697627" cy="246221"/>
+          </a:xfrm>
+          <a:prstGeom prst="rect">
+            <a:avLst/>
+          </a:prstGeom>
+          <a:noFill/>
+        </p:spPr>
+        <p:txBody>
+          <a:bodyPr wrap="none" rtlCol="0">
+            <a:spAutoFit/>
+          </a:bodyPr>
+          <a:lstStyle/>
+          <a:p>
+            <a:pPr algn="ctr"/>
+            <a:r>
+              <a:rPr kumimoji="1" lang="ko-KR" altLang="en-US" sz="1000" dirty="0">
+                <a:solidFill>
+                  <a:srgbClr val="00B0F0"/>
+                </a:solidFill>
+              </a:rPr>
+              <a:t>로그아웃</a:t>
+            </a:r>
+          </a:p>
+        </p:txBody>
+      </p:sp>
+      <p:sp>
+        <p:nvSpPr>
+          <p:cNvPr id="16" name="TextBox 15">
+            <a:extLst>
+              <a:ext uri="{FF2B5EF4-FFF2-40B4-BE49-F238E27FC236}">
+                <a16:creationId xmlns:a16="http://schemas.microsoft.com/office/drawing/2014/main" id="{69074E22-F89C-A349-8330-71928693398F}"/>
+              </a:ext>
+            </a:extLst>
+          </p:cNvPr>
+          <p:cNvSpPr txBox="1"/>
+          <p:nvPr/>
+        </p:nvSpPr>
+        <p:spPr>
+          <a:xfrm>
+            <a:off x="5525535" y="6485507"/>
+            <a:ext cx="1141659" cy="253916"/>
+          </a:xfrm>
+          <a:prstGeom prst="rect">
+            <a:avLst/>
+          </a:prstGeom>
+          <a:noFill/>
+        </p:spPr>
+        <p:txBody>
+          <a:bodyPr wrap="none" rtlCol="0">
+            <a:spAutoFit/>
+          </a:bodyPr>
+          <a:lstStyle/>
+          <a:p>
+            <a:r>
+              <a:rPr kumimoji="1" lang="en-US" altLang="ko-KR" sz="1050" dirty="0">
+                <a:solidFill>
+                  <a:schemeClr val="bg1">
+                    <a:lumMod val="50000"/>
+                  </a:schemeClr>
+                </a:solidFill>
+              </a:rPr>
+              <a:t>@ </a:t>
+            </a:r>
+            <a:r>
+              <a:rPr kumimoji="1" lang="en-US" altLang="ko-KR" sz="1050" dirty="0" err="1">
+                <a:solidFill>
+                  <a:schemeClr val="bg1">
+                    <a:lumMod val="50000"/>
+                  </a:schemeClr>
+                </a:solidFill>
+              </a:rPr>
+              <a:t>about_JCube</a:t>
+            </a:r>
+            <a:endParaRPr kumimoji="1" lang="en-US" altLang="ko-KR" sz="1050" dirty="0">
+              <a:solidFill>
+                <a:schemeClr val="bg1">
+                  <a:lumMod val="50000"/>
+                </a:schemeClr>
+              </a:solidFill>
+            </a:endParaRPr>
+          </a:p>
+        </p:txBody>
+      </p:sp>
+      <p:sp>
+        <p:nvSpPr>
+          <p:cNvPr id="21" name="직사각형 20">
+            <a:extLst>
+              <a:ext uri="{FF2B5EF4-FFF2-40B4-BE49-F238E27FC236}">
+                <a16:creationId xmlns:a16="http://schemas.microsoft.com/office/drawing/2014/main" id="{A871EC61-223C-0447-B82C-FEE0B482521B}"/>
+              </a:ext>
+            </a:extLst>
+          </p:cNvPr>
+          <p:cNvSpPr/>
+          <p:nvPr/>
+        </p:nvSpPr>
+        <p:spPr>
+          <a:xfrm>
+            <a:off x="4894025" y="4107568"/>
+            <a:ext cx="2403951" cy="1867566"/>
+          </a:xfrm>
+          <a:prstGeom prst="rect">
+            <a:avLst/>
+          </a:prstGeom>
+          <a:solidFill>
+            <a:schemeClr val="bg1"/>
+          </a:solidFill>
+          <a:ln>
+            <a:solidFill>
+              <a:schemeClr val="bg1">
+                <a:lumMod val="75000"/>
+              </a:schemeClr>
+            </a:solidFill>
+          </a:ln>
+        </p:spPr>
+        <p:style>
+          <a:lnRef idx="2">
+            <a:schemeClr val="accent1">
+              <a:shade val="50000"/>
+            </a:schemeClr>
+          </a:lnRef>
+          <a:fillRef idx="1">
+            <a:schemeClr val="accent1"/>
+          </a:fillRef>
+          <a:effectRef idx="0">
+            <a:schemeClr val="accent1"/>
+          </a:effectRef>
+          <a:fontRef idx="minor">
+            <a:schemeClr val="lt1"/>
+          </a:fontRef>
+        </p:style>
+        <p:txBody>
+          <a:bodyPr rtlCol="0" anchor="ctr"/>
+          <a:lstStyle/>
+          <a:p>
+            <a:pPr algn="ctr"/>
+            <a:endParaRPr kumimoji="1" lang="ko-KR" altLang="en-US"/>
+          </a:p>
+        </p:txBody>
+      </p:sp>
+      <p:sp>
+        <p:nvSpPr>
+          <p:cNvPr id="22" name="직사각형 21">
+            <a:extLst>
+              <a:ext uri="{FF2B5EF4-FFF2-40B4-BE49-F238E27FC236}">
+                <a16:creationId xmlns:a16="http://schemas.microsoft.com/office/drawing/2014/main" id="{1DF4C30D-B860-CF42-A2D2-8933EF262E6F}"/>
+              </a:ext>
+            </a:extLst>
+          </p:cNvPr>
+          <p:cNvSpPr/>
+          <p:nvPr/>
+        </p:nvSpPr>
+        <p:spPr>
+          <a:xfrm>
+            <a:off x="4894025" y="3181594"/>
+            <a:ext cx="2403951" cy="842653"/>
+          </a:xfrm>
+          <a:prstGeom prst="rect">
+            <a:avLst/>
+          </a:prstGeom>
+          <a:solidFill>
+            <a:schemeClr val="bg1"/>
+          </a:solidFill>
+          <a:ln>
+            <a:solidFill>
+              <a:schemeClr val="bg1">
+                <a:lumMod val="75000"/>
+              </a:schemeClr>
+            </a:solidFill>
+          </a:ln>
+        </p:spPr>
+        <p:style>
+          <a:lnRef idx="2">
+            <a:schemeClr val="accent1">
+              <a:shade val="50000"/>
+            </a:schemeClr>
+          </a:lnRef>
+          <a:fillRef idx="1">
+            <a:schemeClr val="accent1"/>
+          </a:fillRef>
+          <a:effectRef idx="0">
+            <a:schemeClr val="accent1"/>
+          </a:effectRef>
+          <a:fontRef idx="minor">
+            <a:schemeClr val="lt1"/>
+          </a:fontRef>
+        </p:style>
+        <p:txBody>
+          <a:bodyPr rtlCol="0" anchor="ctr"/>
+          <a:lstStyle/>
+          <a:p>
+            <a:pPr algn="ctr"/>
+            <a:endParaRPr kumimoji="1" lang="ko-KR" altLang="en-US"/>
+          </a:p>
+        </p:txBody>
+      </p:sp>
+      <p:sp>
+        <p:nvSpPr>
+          <p:cNvPr id="23" name="모서리가 둥근 직사각형 22">
+            <a:extLst>
+              <a:ext uri="{FF2B5EF4-FFF2-40B4-BE49-F238E27FC236}">
+                <a16:creationId xmlns:a16="http://schemas.microsoft.com/office/drawing/2014/main" id="{A63988F2-FAC3-5045-8EA4-4720DBA24757}"/>
+              </a:ext>
+            </a:extLst>
+          </p:cNvPr>
+          <p:cNvSpPr/>
+          <p:nvPr/>
+        </p:nvSpPr>
+        <p:spPr>
+          <a:xfrm>
+            <a:off x="5171838" y="3608719"/>
+            <a:ext cx="1848323" cy="234616"/>
+          </a:xfrm>
+          <a:prstGeom prst="roundRect">
+            <a:avLst>
+              <a:gd name="adj" fmla="val 12230"/>
+            </a:avLst>
+          </a:prstGeom>
+          <a:solidFill>
+            <a:srgbClr val="00A5FA"/>
+          </a:solidFill>
+          <a:ln>
+            <a:solidFill>
+              <a:srgbClr val="00B0F0"/>
+            </a:solidFill>
+          </a:ln>
+        </p:spPr>
+        <p:style>
+          <a:lnRef idx="2">
+            <a:schemeClr val="accent1">
+              <a:shade val="50000"/>
+            </a:schemeClr>
+          </a:lnRef>
+          <a:fillRef idx="1">
+            <a:schemeClr val="accent1"/>
+          </a:fillRef>
+          <a:effectRef idx="0">
+            <a:schemeClr val="accent1"/>
+          </a:effectRef>
+          <a:fontRef idx="minor">
+            <a:schemeClr val="lt1"/>
+          </a:fontRef>
+        </p:style>
+        <p:txBody>
+          <a:bodyPr rot="0" spcFirstLastPara="0" vertOverflow="overflow" horzOverflow="overflow" vert="horz" wrap="square" lIns="91440" tIns="45720" rIns="91440" bIns="45720" numCol="1" spcCol="0" rtlCol="0" fromWordArt="0" anchor="ctr" anchorCtr="0" forceAA="0" compatLnSpc="1">
+            <a:prstTxWarp prst="textNoShape">
+              <a:avLst/>
+            </a:prstTxWarp>
+            <a:noAutofit/>
+          </a:bodyPr>
+          <a:lstStyle/>
+          <a:p>
+            <a:pPr algn="ctr"/>
+            <a:r>
+              <a:rPr kumimoji="1" lang="ko-KR" altLang="en-US" sz="1000" dirty="0">
+                <a:solidFill>
+                  <a:schemeClr val="bg1"/>
+                </a:solidFill>
+              </a:rPr>
+              <a:t>내역 추가</a:t>
+            </a:r>
+          </a:p>
+        </p:txBody>
+      </p:sp>
+      <p:sp>
+        <p:nvSpPr>
+          <p:cNvPr id="24" name="TextBox 23">
+            <a:extLst>
+              <a:ext uri="{FF2B5EF4-FFF2-40B4-BE49-F238E27FC236}">
+                <a16:creationId xmlns:a16="http://schemas.microsoft.com/office/drawing/2014/main" id="{A10A7A5C-B1F8-864F-8E88-3E5791A48547}"/>
+              </a:ext>
+            </a:extLst>
+          </p:cNvPr>
+          <p:cNvSpPr txBox="1"/>
+          <p:nvPr/>
+        </p:nvSpPr>
+        <p:spPr>
+          <a:xfrm>
+            <a:off x="5295014" y="3337726"/>
+            <a:ext cx="1616148" cy="246221"/>
+          </a:xfrm>
+          <a:prstGeom prst="rect">
+            <a:avLst/>
+          </a:prstGeom>
+          <a:noFill/>
+        </p:spPr>
+        <p:txBody>
+          <a:bodyPr wrap="none" rtlCol="0">
+            <a:spAutoFit/>
+          </a:bodyPr>
+          <a:lstStyle/>
+          <a:p>
+            <a:pPr algn="ctr"/>
+            <a:r>
+              <a:rPr kumimoji="1" lang="ko-KR" altLang="en-US" sz="1000" dirty="0">
+                <a:solidFill>
+                  <a:schemeClr val="tx1">
+                    <a:lumMod val="65000"/>
+                    <a:lumOff val="35000"/>
+                  </a:schemeClr>
+                </a:solidFill>
+              </a:rPr>
+              <a:t>새로운 계산이 생겼다면</a:t>
+            </a:r>
+            <a:r>
+              <a:rPr kumimoji="1" lang="en-US" altLang="ko-KR" sz="1000" dirty="0">
+                <a:solidFill>
+                  <a:schemeClr val="tx1">
+                    <a:lumMod val="65000"/>
+                    <a:lumOff val="35000"/>
+                  </a:schemeClr>
+                </a:solidFill>
+              </a:rPr>
+              <a:t>?</a:t>
+            </a:r>
+            <a:endParaRPr kumimoji="1" lang="ko-KR" altLang="en-US" sz="1000" dirty="0">
+              <a:solidFill>
+                <a:schemeClr val="tx1">
+                  <a:lumMod val="65000"/>
+                  <a:lumOff val="35000"/>
+                </a:schemeClr>
+              </a:solidFill>
+            </a:endParaRPr>
+          </a:p>
+        </p:txBody>
+      </p:sp>
+      <p:sp>
+        <p:nvSpPr>
+          <p:cNvPr id="25" name="모서리가 둥근 직사각형 24">
+            <a:extLst>
+              <a:ext uri="{FF2B5EF4-FFF2-40B4-BE49-F238E27FC236}">
+                <a16:creationId xmlns:a16="http://schemas.microsoft.com/office/drawing/2014/main" id="{09A9694D-0652-AE48-A0AC-1AAC084FD95D}"/>
+              </a:ext>
+            </a:extLst>
+          </p:cNvPr>
+          <p:cNvSpPr/>
+          <p:nvPr/>
+        </p:nvSpPr>
+        <p:spPr>
+          <a:xfrm>
+            <a:off x="5079422" y="5062733"/>
+            <a:ext cx="2033155" cy="484040"/>
+          </a:xfrm>
+          <a:prstGeom prst="roundRect">
+            <a:avLst>
+              <a:gd name="adj" fmla="val 12230"/>
+            </a:avLst>
+          </a:prstGeom>
+          <a:solidFill>
+            <a:schemeClr val="bg1"/>
+          </a:solidFill>
+          <a:ln>
+            <a:solidFill>
+              <a:schemeClr val="bg1">
+                <a:lumMod val="75000"/>
+              </a:schemeClr>
+            </a:solidFill>
+          </a:ln>
+        </p:spPr>
+        <p:style>
+          <a:lnRef idx="2">
+            <a:schemeClr val="accent1">
+              <a:shade val="50000"/>
+            </a:schemeClr>
+          </a:lnRef>
+          <a:fillRef idx="1">
+            <a:schemeClr val="accent1"/>
+          </a:fillRef>
+          <a:effectRef idx="0">
+            <a:schemeClr val="accent1"/>
+          </a:effectRef>
+          <a:fontRef idx="minor">
+            <a:schemeClr val="lt1"/>
+          </a:fontRef>
+        </p:style>
+        <p:txBody>
+          <a:bodyPr rot="0" spcFirstLastPara="0" vertOverflow="overflow" horzOverflow="overflow" vert="horz" wrap="square" lIns="91440" tIns="45720" rIns="91440" bIns="45720" numCol="1" spcCol="0" rtlCol="0" fromWordArt="0" anchor="ctr" anchorCtr="0" forceAA="0" compatLnSpc="1">
+            <a:prstTxWarp prst="textNoShape">
+              <a:avLst/>
+            </a:prstTxWarp>
+            <a:noAutofit/>
+          </a:bodyPr>
+          <a:lstStyle/>
+          <a:p>
+            <a:r>
+              <a:rPr kumimoji="1" lang="ko-KR" altLang="en-US" sz="1100" b="1" dirty="0">
+                <a:solidFill>
+                  <a:schemeClr val="tx1">
+                    <a:lumMod val="75000"/>
+                    <a:lumOff val="25000"/>
+                  </a:schemeClr>
+                </a:solidFill>
+              </a:rPr>
+              <a:t>노래방</a:t>
+            </a:r>
+            <a:r>
+              <a:rPr kumimoji="1" lang="ko-KR" altLang="en-US" sz="1100" b="1" dirty="0">
+                <a:solidFill>
+                  <a:schemeClr val="bg1">
+                    <a:lumMod val="50000"/>
+                  </a:schemeClr>
+                </a:solidFill>
+              </a:rPr>
+              <a:t>  </a:t>
+            </a:r>
+            <a:r>
+              <a:rPr kumimoji="1" lang="ko-KR" altLang="en-US" sz="1100" b="1" dirty="0">
+                <a:solidFill>
+                  <a:srgbClr val="00B0F0"/>
+                </a:solidFill>
+              </a:rPr>
+              <a:t>홍진영</a:t>
+            </a:r>
+            <a:endParaRPr kumimoji="1" lang="en-US" altLang="ko-KR" sz="1100" b="1" dirty="0">
+              <a:solidFill>
+                <a:srgbClr val="00B0F0"/>
+              </a:solidFill>
+            </a:endParaRPr>
+          </a:p>
+          <a:p>
+            <a:pPr algn="r"/>
+            <a:r>
+              <a:rPr kumimoji="1" lang="en-US" altLang="ko-KR" sz="1000" dirty="0">
+                <a:solidFill>
+                  <a:schemeClr val="bg1">
+                    <a:lumMod val="50000"/>
+                  </a:schemeClr>
+                </a:solidFill>
+              </a:rPr>
+              <a:t>25,000</a:t>
+            </a:r>
+            <a:r>
+              <a:rPr kumimoji="1" lang="ko-KR" altLang="en-US" sz="1000" dirty="0">
+                <a:solidFill>
+                  <a:schemeClr val="bg1">
+                    <a:lumMod val="50000"/>
+                  </a:schemeClr>
+                </a:solidFill>
+              </a:rPr>
+              <a:t>원</a:t>
+            </a:r>
+          </a:p>
+        </p:txBody>
+      </p:sp>
+      <p:sp>
+        <p:nvSpPr>
+          <p:cNvPr id="26" name="모서리가 둥근 직사각형 25">
+            <a:extLst>
+              <a:ext uri="{FF2B5EF4-FFF2-40B4-BE49-F238E27FC236}">
+                <a16:creationId xmlns:a16="http://schemas.microsoft.com/office/drawing/2014/main" id="{2D84FF30-0FEE-3A49-937B-6991B10B5CD3}"/>
+              </a:ext>
+            </a:extLst>
+          </p:cNvPr>
+          <p:cNvSpPr/>
+          <p:nvPr/>
+        </p:nvSpPr>
+        <p:spPr>
+          <a:xfrm>
+            <a:off x="5079422" y="5648334"/>
+            <a:ext cx="2033155" cy="484040"/>
+          </a:xfrm>
+          <a:prstGeom prst="roundRect">
+            <a:avLst>
+              <a:gd name="adj" fmla="val 12230"/>
+            </a:avLst>
+          </a:prstGeom>
+          <a:solidFill>
+            <a:schemeClr val="bg1"/>
+          </a:solidFill>
+          <a:ln>
+            <a:solidFill>
+              <a:schemeClr val="bg1">
+                <a:lumMod val="75000"/>
+              </a:schemeClr>
+            </a:solidFill>
+          </a:ln>
+        </p:spPr>
+        <p:style>
+          <a:lnRef idx="2">
+            <a:schemeClr val="accent1">
+              <a:shade val="50000"/>
+            </a:schemeClr>
+          </a:lnRef>
+          <a:fillRef idx="1">
+            <a:schemeClr val="accent1"/>
+          </a:fillRef>
+          <a:effectRef idx="0">
+            <a:schemeClr val="accent1"/>
+          </a:effectRef>
+          <a:fontRef idx="minor">
+            <a:schemeClr val="lt1"/>
+          </a:fontRef>
+        </p:style>
+        <p:txBody>
+          <a:bodyPr rot="0" spcFirstLastPara="0" vertOverflow="overflow" horzOverflow="overflow" vert="horz" wrap="square" lIns="91440" tIns="45720" rIns="91440" bIns="45720" numCol="1" spcCol="0" rtlCol="0" fromWordArt="0" anchor="ctr" anchorCtr="0" forceAA="0" compatLnSpc="1">
+            <a:prstTxWarp prst="textNoShape">
+              <a:avLst/>
+            </a:prstTxWarp>
+            <a:noAutofit/>
+          </a:bodyPr>
+          <a:lstStyle/>
+          <a:p>
+            <a:r>
+              <a:rPr kumimoji="1" lang="ko-KR" altLang="en-US" sz="1100" b="1" dirty="0">
+                <a:solidFill>
+                  <a:schemeClr val="tx1">
+                    <a:lumMod val="75000"/>
+                    <a:lumOff val="25000"/>
+                  </a:schemeClr>
+                </a:solidFill>
+              </a:rPr>
+              <a:t>카페 </a:t>
+            </a:r>
+            <a:r>
+              <a:rPr kumimoji="1" lang="ko-KR" altLang="en-US" sz="1100" b="1" dirty="0">
+                <a:solidFill>
+                  <a:schemeClr val="bg1">
+                    <a:lumMod val="50000"/>
+                  </a:schemeClr>
+                </a:solidFill>
+              </a:rPr>
+              <a:t> </a:t>
+            </a:r>
+            <a:r>
+              <a:rPr kumimoji="1" lang="ko-KR" altLang="en-US" sz="1100" b="1" dirty="0" err="1">
+                <a:solidFill>
+                  <a:srgbClr val="00B0F0"/>
+                </a:solidFill>
+              </a:rPr>
+              <a:t>홍록기</a:t>
+            </a:r>
+            <a:endParaRPr kumimoji="1" lang="en-US" altLang="ko-KR" sz="1100" b="1" dirty="0">
+              <a:solidFill>
+                <a:srgbClr val="00B0F0"/>
+              </a:solidFill>
+            </a:endParaRPr>
+          </a:p>
+          <a:p>
+            <a:pPr algn="r"/>
+            <a:r>
+              <a:rPr kumimoji="1" lang="en-US" altLang="ko-KR" sz="1000" dirty="0">
+                <a:solidFill>
+                  <a:schemeClr val="bg1">
+                    <a:lumMod val="50000"/>
+                  </a:schemeClr>
+                </a:solidFill>
+              </a:rPr>
+              <a:t>30,000</a:t>
+            </a:r>
+            <a:r>
+              <a:rPr kumimoji="1" lang="ko-KR" altLang="en-US" sz="1000" dirty="0">
+                <a:solidFill>
+                  <a:schemeClr val="bg1">
+                    <a:lumMod val="50000"/>
+                  </a:schemeClr>
+                </a:solidFill>
+              </a:rPr>
+              <a:t>원 </a:t>
+            </a:r>
+          </a:p>
+        </p:txBody>
+      </p:sp>
+      <p:sp>
+        <p:nvSpPr>
+          <p:cNvPr id="27" name="직사각형 26">
+            <a:extLst>
+              <a:ext uri="{FF2B5EF4-FFF2-40B4-BE49-F238E27FC236}">
+                <a16:creationId xmlns:a16="http://schemas.microsoft.com/office/drawing/2014/main" id="{324B93C4-54CD-364D-AE04-E89369BD362F}"/>
+              </a:ext>
+            </a:extLst>
+          </p:cNvPr>
+          <p:cNvSpPr/>
+          <p:nvPr/>
+        </p:nvSpPr>
+        <p:spPr>
+          <a:xfrm>
+            <a:off x="4901105" y="5974221"/>
+            <a:ext cx="2403951" cy="253636"/>
+          </a:xfrm>
+          <a:prstGeom prst="rect">
+            <a:avLst/>
+          </a:prstGeom>
+          <a:solidFill>
+            <a:srgbClr val="F6F6F6"/>
+          </a:solidFill>
+          <a:ln>
+            <a:noFill/>
+          </a:ln>
+        </p:spPr>
+        <p:style>
+          <a:lnRef idx="2">
+            <a:schemeClr val="accent1">
+              <a:shade val="50000"/>
+            </a:schemeClr>
+          </a:lnRef>
+          <a:fillRef idx="1">
+            <a:schemeClr val="accent1"/>
+          </a:fillRef>
+          <a:effectRef idx="0">
+            <a:schemeClr val="accent1"/>
+          </a:effectRef>
+          <a:fontRef idx="minor">
+            <a:schemeClr val="lt1"/>
+          </a:fontRef>
+        </p:style>
+        <p:txBody>
+          <a:bodyPr rtlCol="0" anchor="ctr"/>
+          <a:lstStyle/>
+          <a:p>
+            <a:pPr algn="ctr"/>
+            <a:endParaRPr kumimoji="1" lang="ko-KR" altLang="en-US"/>
+          </a:p>
+        </p:txBody>
+      </p:sp>
+      <p:cxnSp>
+        <p:nvCxnSpPr>
+          <p:cNvPr id="3" name="직선 연결선[R] 2">
+            <a:extLst>
+              <a:ext uri="{FF2B5EF4-FFF2-40B4-BE49-F238E27FC236}">
+                <a16:creationId xmlns:a16="http://schemas.microsoft.com/office/drawing/2014/main" id="{703E2DF6-4AB2-EF49-A3C5-F19D70859C0E}"/>
+              </a:ext>
+            </a:extLst>
+          </p:cNvPr>
+          <p:cNvCxnSpPr/>
+          <p:nvPr/>
+        </p:nvCxnSpPr>
+        <p:spPr>
+          <a:xfrm>
+            <a:off x="4901105" y="5981148"/>
+            <a:ext cx="2403951" cy="0"/>
+          </a:xfrm>
+          <a:prstGeom prst="line">
+            <a:avLst/>
+          </a:prstGeom>
+          <a:ln w="12700">
+            <a:solidFill>
+              <a:schemeClr val="bg1">
+                <a:lumMod val="75000"/>
+              </a:schemeClr>
+            </a:solidFill>
+          </a:ln>
+        </p:spPr>
+        <p:style>
+          <a:lnRef idx="1">
+            <a:schemeClr val="accent1"/>
+          </a:lnRef>
+          <a:fillRef idx="0">
+            <a:schemeClr val="accent1"/>
+          </a:fillRef>
+          <a:effectRef idx="0">
+            <a:schemeClr val="accent1"/>
+          </a:effectRef>
+          <a:fontRef idx="minor">
+            <a:schemeClr val="tx1"/>
+          </a:fontRef>
+        </p:style>
+      </p:cxnSp>
+      <p:sp>
+        <p:nvSpPr>
+          <p:cNvPr id="28" name="모서리가 둥근 직사각형 27">
+            <a:extLst>
+              <a:ext uri="{FF2B5EF4-FFF2-40B4-BE49-F238E27FC236}">
+                <a16:creationId xmlns:a16="http://schemas.microsoft.com/office/drawing/2014/main" id="{777FA8F5-1A96-B147-83BA-21C0D5D60CB4}"/>
+              </a:ext>
+            </a:extLst>
+          </p:cNvPr>
+          <p:cNvSpPr/>
+          <p:nvPr/>
+        </p:nvSpPr>
+        <p:spPr>
+          <a:xfrm>
+            <a:off x="5079422" y="4480886"/>
+            <a:ext cx="2033155" cy="484040"/>
+          </a:xfrm>
+          <a:prstGeom prst="roundRect">
+            <a:avLst>
+              <a:gd name="adj" fmla="val 12230"/>
+            </a:avLst>
+          </a:prstGeom>
+          <a:solidFill>
+            <a:schemeClr val="bg1"/>
+          </a:solidFill>
+          <a:ln>
+            <a:solidFill>
+              <a:schemeClr val="bg1">
+                <a:lumMod val="75000"/>
+              </a:schemeClr>
+            </a:solidFill>
+          </a:ln>
+        </p:spPr>
+        <p:style>
+          <a:lnRef idx="2">
+            <a:schemeClr val="accent1">
+              <a:shade val="50000"/>
+            </a:schemeClr>
+          </a:lnRef>
+          <a:fillRef idx="1">
+            <a:schemeClr val="accent1"/>
+          </a:fillRef>
+          <a:effectRef idx="0">
+            <a:schemeClr val="accent1"/>
+          </a:effectRef>
+          <a:fontRef idx="minor">
+            <a:schemeClr val="lt1"/>
+          </a:fontRef>
+        </p:style>
+        <p:txBody>
+          <a:bodyPr rot="0" spcFirstLastPara="0" vertOverflow="overflow" horzOverflow="overflow" vert="horz" wrap="square" lIns="91440" tIns="45720" rIns="91440" bIns="45720" numCol="1" spcCol="0" rtlCol="0" fromWordArt="0" anchor="ctr" anchorCtr="0" forceAA="0" compatLnSpc="1">
+            <a:prstTxWarp prst="textNoShape">
+              <a:avLst/>
+            </a:prstTxWarp>
+            <a:noAutofit/>
+          </a:bodyPr>
+          <a:lstStyle/>
+          <a:p>
+            <a:r>
               <a:rPr kumimoji="1" lang="ko-KR" altLang="en-US" sz="1100" b="1" dirty="0">
                 <a:solidFill>
                   <a:schemeClr val="tx1">
@@ -7221,6 +8833,2028 @@
     <p:extLst>
       <p:ext uri="{BB962C8B-B14F-4D97-AF65-F5344CB8AC3E}">
         <p14:creationId xmlns:p14="http://schemas.microsoft.com/office/powerpoint/2010/main" val="372750629"/>
+      </p:ext>
+    </p:extLst>
+  </p:cSld>
+  <p:clrMapOvr>
+    <a:masterClrMapping/>
+  </p:clrMapOvr>
+</p:sld>
+</file>
+
+<file path=ppt/slides/slide6.xml><?xml version="1.0" encoding="utf-8"?>
+<p:sld xmlns:a="http://schemas.openxmlformats.org/drawingml/2006/main" xmlns:r="http://schemas.openxmlformats.org/officeDocument/2006/relationships" xmlns:p="http://schemas.openxmlformats.org/presentationml/2006/main">
+  <p:cSld>
+    <p:spTree>
+      <p:nvGrpSpPr>
+        <p:cNvPr id="1" name=""/>
+        <p:cNvGrpSpPr/>
+        <p:nvPr/>
+      </p:nvGrpSpPr>
+      <p:grpSpPr>
+        <a:xfrm>
+          <a:off x="0" y="0"/>
+          <a:ext cx="0" cy="0"/>
+          <a:chOff x="0" y="0"/>
+          <a:chExt cx="0" cy="0"/>
+        </a:xfrm>
+      </p:grpSpPr>
+      <p:sp>
+        <p:nvSpPr>
+          <p:cNvPr id="4" name="직사각형 3">
+            <a:extLst>
+              <a:ext uri="{FF2B5EF4-FFF2-40B4-BE49-F238E27FC236}">
+                <a16:creationId xmlns:a16="http://schemas.microsoft.com/office/drawing/2014/main" id="{EA2D8D37-742E-EF4A-A579-D4FCE47462A2}"/>
+              </a:ext>
+            </a:extLst>
+          </p:cNvPr>
+          <p:cNvSpPr/>
+          <p:nvPr/>
+        </p:nvSpPr>
+        <p:spPr>
+          <a:xfrm>
+            <a:off x="4894025" y="1312130"/>
+            <a:ext cx="2403951" cy="2333999"/>
+          </a:xfrm>
+          <a:prstGeom prst="rect">
+            <a:avLst/>
+          </a:prstGeom>
+          <a:solidFill>
+            <a:schemeClr val="bg1"/>
+          </a:solidFill>
+          <a:ln>
+            <a:solidFill>
+              <a:schemeClr val="bg1">
+                <a:lumMod val="75000"/>
+              </a:schemeClr>
+            </a:solidFill>
+          </a:ln>
+        </p:spPr>
+        <p:style>
+          <a:lnRef idx="2">
+            <a:schemeClr val="accent1">
+              <a:shade val="50000"/>
+            </a:schemeClr>
+          </a:lnRef>
+          <a:fillRef idx="1">
+            <a:schemeClr val="accent1"/>
+          </a:fillRef>
+          <a:effectRef idx="0">
+            <a:schemeClr val="accent1"/>
+          </a:effectRef>
+          <a:fontRef idx="minor">
+            <a:schemeClr val="lt1"/>
+          </a:fontRef>
+        </p:style>
+        <p:txBody>
+          <a:bodyPr rtlCol="0" anchor="ctr"/>
+          <a:lstStyle/>
+          <a:p>
+            <a:pPr algn="ctr"/>
+            <a:endParaRPr kumimoji="1" lang="ko-KR" altLang="en-US" dirty="0"/>
+          </a:p>
+        </p:txBody>
+      </p:sp>
+      <p:sp>
+        <p:nvSpPr>
+          <p:cNvPr id="5" name="직사각형 4">
+            <a:extLst>
+              <a:ext uri="{FF2B5EF4-FFF2-40B4-BE49-F238E27FC236}">
+                <a16:creationId xmlns:a16="http://schemas.microsoft.com/office/drawing/2014/main" id="{263AF4BD-43FD-F444-9213-EF34F45DC1F1}"/>
+              </a:ext>
+            </a:extLst>
+          </p:cNvPr>
+          <p:cNvSpPr/>
+          <p:nvPr/>
+        </p:nvSpPr>
+        <p:spPr>
+          <a:xfrm>
+            <a:off x="4894025" y="3716313"/>
+            <a:ext cx="2403951" cy="722021"/>
+          </a:xfrm>
+          <a:prstGeom prst="rect">
+            <a:avLst/>
+          </a:prstGeom>
+          <a:solidFill>
+            <a:schemeClr val="bg1"/>
+          </a:solidFill>
+          <a:ln>
+            <a:solidFill>
+              <a:schemeClr val="bg1">
+                <a:lumMod val="75000"/>
+              </a:schemeClr>
+            </a:solidFill>
+          </a:ln>
+        </p:spPr>
+        <p:style>
+          <a:lnRef idx="2">
+            <a:schemeClr val="accent1">
+              <a:shade val="50000"/>
+            </a:schemeClr>
+          </a:lnRef>
+          <a:fillRef idx="1">
+            <a:schemeClr val="accent1"/>
+          </a:fillRef>
+          <a:effectRef idx="0">
+            <a:schemeClr val="accent1"/>
+          </a:effectRef>
+          <a:fontRef idx="minor">
+            <a:schemeClr val="lt1"/>
+          </a:fontRef>
+        </p:style>
+        <p:txBody>
+          <a:bodyPr rtlCol="0" anchor="ctr"/>
+          <a:lstStyle/>
+          <a:p>
+            <a:pPr algn="ctr"/>
+            <a:endParaRPr kumimoji="1" lang="ko-KR" altLang="en-US" dirty="0"/>
+          </a:p>
+        </p:txBody>
+      </p:sp>
+      <p:sp>
+        <p:nvSpPr>
+          <p:cNvPr id="7" name="TextBox 6">
+            <a:extLst>
+              <a:ext uri="{FF2B5EF4-FFF2-40B4-BE49-F238E27FC236}">
+                <a16:creationId xmlns:a16="http://schemas.microsoft.com/office/drawing/2014/main" id="{71C06810-FA81-E844-8CB0-A63915BE67EA}"/>
+              </a:ext>
+            </a:extLst>
+          </p:cNvPr>
+          <p:cNvSpPr txBox="1"/>
+          <p:nvPr/>
+        </p:nvSpPr>
+        <p:spPr>
+          <a:xfrm>
+            <a:off x="5080205" y="3890953"/>
+            <a:ext cx="2045753" cy="246221"/>
+          </a:xfrm>
+          <a:prstGeom prst="rect">
+            <a:avLst/>
+          </a:prstGeom>
+          <a:noFill/>
+        </p:spPr>
+        <p:txBody>
+          <a:bodyPr wrap="none" rtlCol="0">
+            <a:spAutoFit/>
+          </a:bodyPr>
+          <a:lstStyle/>
+          <a:p>
+            <a:pPr algn="ctr"/>
+            <a:r>
+              <a:rPr kumimoji="1" lang="ko-KR" altLang="en-US" sz="1000" dirty="0"/>
+              <a:t>계정을 만들고 싶다면</a:t>
+            </a:r>
+            <a:r>
+              <a:rPr kumimoji="1" lang="en-US" altLang="ko-KR" sz="1000" dirty="0"/>
+              <a:t>?</a:t>
+            </a:r>
+            <a:r>
+              <a:rPr kumimoji="1" lang="ko-KR" altLang="en-US" sz="1000" dirty="0"/>
+              <a:t> </a:t>
+            </a:r>
+            <a:r>
+              <a:rPr kumimoji="1" lang="ko-KR" altLang="en-US" sz="1000" dirty="0">
+                <a:solidFill>
+                  <a:srgbClr val="00B0F0"/>
+                </a:solidFill>
+              </a:rPr>
+              <a:t>회원가입</a:t>
+            </a:r>
+          </a:p>
+        </p:txBody>
+      </p:sp>
+      <p:sp>
+        <p:nvSpPr>
+          <p:cNvPr id="12" name="모서리가 둥근 직사각형 11">
+            <a:extLst>
+              <a:ext uri="{FF2B5EF4-FFF2-40B4-BE49-F238E27FC236}">
+                <a16:creationId xmlns:a16="http://schemas.microsoft.com/office/drawing/2014/main" id="{C5488FC6-282C-7148-82F7-288317848D5E}"/>
+              </a:ext>
+            </a:extLst>
+          </p:cNvPr>
+          <p:cNvSpPr/>
+          <p:nvPr/>
+        </p:nvSpPr>
+        <p:spPr>
+          <a:xfrm>
+            <a:off x="5171838" y="3122738"/>
+            <a:ext cx="1848323" cy="234616"/>
+          </a:xfrm>
+          <a:prstGeom prst="roundRect">
+            <a:avLst>
+              <a:gd name="adj" fmla="val 12230"/>
+            </a:avLst>
+          </a:prstGeom>
+          <a:solidFill>
+            <a:srgbClr val="00A5FA"/>
+          </a:solidFill>
+          <a:ln>
+            <a:solidFill>
+              <a:srgbClr val="00B0F0"/>
+            </a:solidFill>
+          </a:ln>
+        </p:spPr>
+        <p:style>
+          <a:lnRef idx="2">
+            <a:schemeClr val="accent1">
+              <a:shade val="50000"/>
+            </a:schemeClr>
+          </a:lnRef>
+          <a:fillRef idx="1">
+            <a:schemeClr val="accent1"/>
+          </a:fillRef>
+          <a:effectRef idx="0">
+            <a:schemeClr val="accent1"/>
+          </a:effectRef>
+          <a:fontRef idx="minor">
+            <a:schemeClr val="lt1"/>
+          </a:fontRef>
+        </p:style>
+        <p:txBody>
+          <a:bodyPr rot="0" spcFirstLastPara="0" vertOverflow="overflow" horzOverflow="overflow" vert="horz" wrap="square" lIns="91440" tIns="45720" rIns="91440" bIns="45720" numCol="1" spcCol="0" rtlCol="0" fromWordArt="0" anchor="ctr" anchorCtr="0" forceAA="0" compatLnSpc="1">
+            <a:prstTxWarp prst="textNoShape">
+              <a:avLst/>
+            </a:prstTxWarp>
+            <a:noAutofit/>
+          </a:bodyPr>
+          <a:lstStyle/>
+          <a:p>
+            <a:pPr algn="ctr"/>
+            <a:r>
+              <a:rPr kumimoji="1" lang="ko-KR" altLang="en-US" sz="1000" dirty="0">
+                <a:solidFill>
+                  <a:schemeClr val="bg1"/>
+                </a:solidFill>
+              </a:rPr>
+              <a:t>로그인</a:t>
+            </a:r>
+          </a:p>
+        </p:txBody>
+      </p:sp>
+      <p:sp>
+        <p:nvSpPr>
+          <p:cNvPr id="13" name="TextBox 12">
+            <a:extLst>
+              <a:ext uri="{FF2B5EF4-FFF2-40B4-BE49-F238E27FC236}">
+                <a16:creationId xmlns:a16="http://schemas.microsoft.com/office/drawing/2014/main" id="{852B469B-6110-9446-A9BB-C28049DB396C}"/>
+              </a:ext>
+            </a:extLst>
+          </p:cNvPr>
+          <p:cNvSpPr txBox="1"/>
+          <p:nvPr/>
+        </p:nvSpPr>
+        <p:spPr>
+          <a:xfrm>
+            <a:off x="6405385" y="2831354"/>
+            <a:ext cx="673582" cy="184666"/>
+          </a:xfrm>
+          <a:prstGeom prst="rect">
+            <a:avLst/>
+          </a:prstGeom>
+          <a:noFill/>
+        </p:spPr>
+        <p:txBody>
+          <a:bodyPr wrap="none" rtlCol="0">
+            <a:spAutoFit/>
+          </a:bodyPr>
+          <a:lstStyle/>
+          <a:p>
+            <a:pPr algn="ctr"/>
+            <a:r>
+              <a:rPr kumimoji="1" lang="ko-KR" altLang="en-US" sz="600" dirty="0">
+                <a:solidFill>
+                  <a:srgbClr val="00B0F0"/>
+                </a:solidFill>
+              </a:rPr>
+              <a:t>비밀번호 찾기</a:t>
+            </a:r>
+          </a:p>
+        </p:txBody>
+      </p:sp>
+      <p:sp>
+        <p:nvSpPr>
+          <p:cNvPr id="14" name="TextBox 13">
+            <a:extLst>
+              <a:ext uri="{FF2B5EF4-FFF2-40B4-BE49-F238E27FC236}">
+                <a16:creationId xmlns:a16="http://schemas.microsoft.com/office/drawing/2014/main" id="{5B516E62-67EC-1843-A453-45B117B38417}"/>
+              </a:ext>
+            </a:extLst>
+          </p:cNvPr>
+          <p:cNvSpPr txBox="1"/>
+          <p:nvPr/>
+        </p:nvSpPr>
+        <p:spPr>
+          <a:xfrm>
+            <a:off x="5695893" y="1465272"/>
+            <a:ext cx="800219" cy="584775"/>
+          </a:xfrm>
+          <a:prstGeom prst="rect">
+            <a:avLst/>
+          </a:prstGeom>
+          <a:noFill/>
+        </p:spPr>
+        <p:txBody>
+          <a:bodyPr wrap="none" rtlCol="0">
+            <a:spAutoFit/>
+          </a:bodyPr>
+          <a:lstStyle/>
+          <a:p>
+            <a:pPr algn="ctr"/>
+            <a:r>
+              <a:rPr kumimoji="1" lang="ko-KR" altLang="en-US" sz="1600" b="1" dirty="0"/>
+              <a:t>활빈당</a:t>
+            </a:r>
+            <a:endParaRPr kumimoji="1" lang="en-US" altLang="ko-KR" sz="1600" b="1" dirty="0"/>
+          </a:p>
+          <a:p>
+            <a:pPr algn="ctr"/>
+            <a:r>
+              <a:rPr kumimoji="1" lang="ko-KR" altLang="en-US" sz="1600" b="1" dirty="0"/>
+              <a:t>입장</a:t>
+            </a:r>
+          </a:p>
+        </p:txBody>
+      </p:sp>
+      <p:sp>
+        <p:nvSpPr>
+          <p:cNvPr id="16" name="모서리가 둥근 직사각형 15">
+            <a:extLst>
+              <a:ext uri="{FF2B5EF4-FFF2-40B4-BE49-F238E27FC236}">
+                <a16:creationId xmlns:a16="http://schemas.microsoft.com/office/drawing/2014/main" id="{01A6D671-79C6-4C4A-AE77-03D0B7A9C7D5}"/>
+              </a:ext>
+            </a:extLst>
+          </p:cNvPr>
+          <p:cNvSpPr/>
+          <p:nvPr/>
+        </p:nvSpPr>
+        <p:spPr>
+          <a:xfrm>
+            <a:off x="5171838" y="2490570"/>
+            <a:ext cx="1848323" cy="234616"/>
+          </a:xfrm>
+          <a:prstGeom prst="roundRect">
+            <a:avLst>
+              <a:gd name="adj" fmla="val 12230"/>
+            </a:avLst>
+          </a:prstGeom>
+          <a:solidFill>
+            <a:srgbClr val="F6F6F6"/>
+          </a:solidFill>
+          <a:ln>
+            <a:solidFill>
+              <a:schemeClr val="bg1">
+                <a:lumMod val="75000"/>
+              </a:schemeClr>
+            </a:solidFill>
+          </a:ln>
+        </p:spPr>
+        <p:style>
+          <a:lnRef idx="2">
+            <a:schemeClr val="accent1">
+              <a:shade val="50000"/>
+            </a:schemeClr>
+          </a:lnRef>
+          <a:fillRef idx="1">
+            <a:schemeClr val="accent1"/>
+          </a:fillRef>
+          <a:effectRef idx="0">
+            <a:schemeClr val="accent1"/>
+          </a:effectRef>
+          <a:fontRef idx="minor">
+            <a:schemeClr val="lt1"/>
+          </a:fontRef>
+        </p:style>
+        <p:txBody>
+          <a:bodyPr rot="0" spcFirstLastPara="0" vertOverflow="overflow" horzOverflow="overflow" vert="horz" wrap="square" lIns="91440" tIns="45720" rIns="91440" bIns="45720" numCol="1" spcCol="0" rtlCol="0" fromWordArt="0" anchor="ctr" anchorCtr="0" forceAA="0" compatLnSpc="1">
+            <a:prstTxWarp prst="textNoShape">
+              <a:avLst/>
+            </a:prstTxWarp>
+            <a:noAutofit/>
+          </a:bodyPr>
+          <a:lstStyle/>
+          <a:p>
+            <a:pPr algn="ctr"/>
+            <a:r>
+              <a:rPr kumimoji="1" lang="en-US" altLang="ko-KR" sz="1000" dirty="0">
+                <a:solidFill>
+                  <a:schemeClr val="bg1">
+                    <a:lumMod val="50000"/>
+                  </a:schemeClr>
+                </a:solidFill>
+              </a:rPr>
+              <a:t>Password</a:t>
+            </a:r>
+            <a:endParaRPr kumimoji="1" lang="ko-KR" altLang="en-US" sz="1000" dirty="0">
+              <a:solidFill>
+                <a:schemeClr val="bg1">
+                  <a:lumMod val="50000"/>
+                </a:schemeClr>
+              </a:solidFill>
+            </a:endParaRPr>
+          </a:p>
+        </p:txBody>
+      </p:sp>
+      <p:sp>
+        <p:nvSpPr>
+          <p:cNvPr id="17" name="모서리가 둥근 직사각형 16">
+            <a:extLst>
+              <a:ext uri="{FF2B5EF4-FFF2-40B4-BE49-F238E27FC236}">
+                <a16:creationId xmlns:a16="http://schemas.microsoft.com/office/drawing/2014/main" id="{09C1CA4A-D32A-EF40-8921-7271B583A07F}"/>
+              </a:ext>
+            </a:extLst>
+          </p:cNvPr>
+          <p:cNvSpPr/>
+          <p:nvPr/>
+        </p:nvSpPr>
+        <p:spPr>
+          <a:xfrm>
+            <a:off x="5171838" y="2185770"/>
+            <a:ext cx="1848323" cy="234616"/>
+          </a:xfrm>
+          <a:prstGeom prst="roundRect">
+            <a:avLst>
+              <a:gd name="adj" fmla="val 12230"/>
+            </a:avLst>
+          </a:prstGeom>
+          <a:solidFill>
+            <a:srgbClr val="F6F6F6"/>
+          </a:solidFill>
+          <a:ln>
+            <a:solidFill>
+              <a:schemeClr val="bg1">
+                <a:lumMod val="75000"/>
+              </a:schemeClr>
+            </a:solidFill>
+          </a:ln>
+        </p:spPr>
+        <p:style>
+          <a:lnRef idx="2">
+            <a:schemeClr val="accent1">
+              <a:shade val="50000"/>
+            </a:schemeClr>
+          </a:lnRef>
+          <a:fillRef idx="1">
+            <a:schemeClr val="accent1"/>
+          </a:fillRef>
+          <a:effectRef idx="0">
+            <a:schemeClr val="accent1"/>
+          </a:effectRef>
+          <a:fontRef idx="minor">
+            <a:schemeClr val="lt1"/>
+          </a:fontRef>
+        </p:style>
+        <p:txBody>
+          <a:bodyPr rot="0" spcFirstLastPara="0" vertOverflow="overflow" horzOverflow="overflow" vert="horz" wrap="square" lIns="91440" tIns="45720" rIns="91440" bIns="45720" numCol="1" spcCol="0" rtlCol="0" fromWordArt="0" anchor="ctr" anchorCtr="0" forceAA="0" compatLnSpc="1">
+            <a:prstTxWarp prst="textNoShape">
+              <a:avLst/>
+            </a:prstTxWarp>
+            <a:noAutofit/>
+          </a:bodyPr>
+          <a:lstStyle/>
+          <a:p>
+            <a:pPr algn="ctr"/>
+            <a:r>
+              <a:rPr kumimoji="1" lang="en-US" altLang="ko-KR" sz="1000" dirty="0">
+                <a:solidFill>
+                  <a:schemeClr val="bg1">
+                    <a:lumMod val="50000"/>
+                  </a:schemeClr>
+                </a:solidFill>
+              </a:rPr>
+              <a:t>Username</a:t>
+            </a:r>
+            <a:endParaRPr kumimoji="1" lang="ko-KR" altLang="en-US" sz="1000" dirty="0">
+              <a:solidFill>
+                <a:schemeClr val="bg1">
+                  <a:lumMod val="50000"/>
+                </a:schemeClr>
+              </a:solidFill>
+            </a:endParaRPr>
+          </a:p>
+        </p:txBody>
+      </p:sp>
+      <p:sp>
+        <p:nvSpPr>
+          <p:cNvPr id="18" name="TextBox 17">
+            <a:extLst>
+              <a:ext uri="{FF2B5EF4-FFF2-40B4-BE49-F238E27FC236}">
+                <a16:creationId xmlns:a16="http://schemas.microsoft.com/office/drawing/2014/main" id="{64FA5B03-79E4-524D-960A-19138A7FD148}"/>
+              </a:ext>
+            </a:extLst>
+          </p:cNvPr>
+          <p:cNvSpPr txBox="1"/>
+          <p:nvPr/>
+        </p:nvSpPr>
+        <p:spPr>
+          <a:xfrm>
+            <a:off x="5525535" y="4131895"/>
+            <a:ext cx="1141659" cy="253916"/>
+          </a:xfrm>
+          <a:prstGeom prst="rect">
+            <a:avLst/>
+          </a:prstGeom>
+          <a:noFill/>
+        </p:spPr>
+        <p:txBody>
+          <a:bodyPr wrap="none" rtlCol="0">
+            <a:spAutoFit/>
+          </a:bodyPr>
+          <a:lstStyle/>
+          <a:p>
+            <a:r>
+              <a:rPr kumimoji="1" lang="en-US" altLang="ko-KR" sz="1050" dirty="0">
+                <a:solidFill>
+                  <a:schemeClr val="bg1">
+                    <a:lumMod val="50000"/>
+                  </a:schemeClr>
+                </a:solidFill>
+              </a:rPr>
+              <a:t>@ </a:t>
+            </a:r>
+            <a:r>
+              <a:rPr kumimoji="1" lang="en-US" altLang="ko-KR" sz="1050" dirty="0" err="1">
+                <a:solidFill>
+                  <a:schemeClr val="bg1">
+                    <a:lumMod val="50000"/>
+                  </a:schemeClr>
+                </a:solidFill>
+              </a:rPr>
+              <a:t>about_JCube</a:t>
+            </a:r>
+            <a:endParaRPr kumimoji="1" lang="en-US" altLang="ko-KR" sz="1050" dirty="0">
+              <a:solidFill>
+                <a:schemeClr val="bg1">
+                  <a:lumMod val="50000"/>
+                </a:schemeClr>
+              </a:solidFill>
+            </a:endParaRPr>
+          </a:p>
+        </p:txBody>
+      </p:sp>
+      <p:sp>
+        <p:nvSpPr>
+          <p:cNvPr id="20" name="직사각형 19">
+            <a:extLst>
+              <a:ext uri="{FF2B5EF4-FFF2-40B4-BE49-F238E27FC236}">
+                <a16:creationId xmlns:a16="http://schemas.microsoft.com/office/drawing/2014/main" id="{0E76A8CE-9DC1-A14E-991E-0850C142A1F5}"/>
+              </a:ext>
+            </a:extLst>
+          </p:cNvPr>
+          <p:cNvSpPr/>
+          <p:nvPr/>
+        </p:nvSpPr>
+        <p:spPr>
+          <a:xfrm>
+            <a:off x="4894025" y="4519769"/>
+            <a:ext cx="2403951" cy="722021"/>
+          </a:xfrm>
+          <a:prstGeom prst="rect">
+            <a:avLst/>
+          </a:prstGeom>
+          <a:solidFill>
+            <a:schemeClr val="bg1"/>
+          </a:solidFill>
+          <a:ln>
+            <a:solidFill>
+              <a:schemeClr val="bg1">
+                <a:lumMod val="75000"/>
+              </a:schemeClr>
+            </a:solidFill>
+          </a:ln>
+        </p:spPr>
+        <p:style>
+          <a:lnRef idx="2">
+            <a:schemeClr val="accent1">
+              <a:shade val="50000"/>
+            </a:schemeClr>
+          </a:lnRef>
+          <a:fillRef idx="1">
+            <a:schemeClr val="accent1"/>
+          </a:fillRef>
+          <a:effectRef idx="0">
+            <a:schemeClr val="accent1"/>
+          </a:effectRef>
+          <a:fontRef idx="minor">
+            <a:schemeClr val="lt1"/>
+          </a:fontRef>
+        </p:style>
+        <p:txBody>
+          <a:bodyPr rtlCol="0" anchor="ctr"/>
+          <a:lstStyle/>
+          <a:p>
+            <a:pPr algn="ctr"/>
+            <a:endParaRPr kumimoji="1" lang="ko-KR" altLang="en-US" dirty="0"/>
+          </a:p>
+        </p:txBody>
+      </p:sp>
+      <p:sp>
+        <p:nvSpPr>
+          <p:cNvPr id="23" name="모서리가 둥근 직사각형 22">
+            <a:extLst>
+              <a:ext uri="{FF2B5EF4-FFF2-40B4-BE49-F238E27FC236}">
+                <a16:creationId xmlns:a16="http://schemas.microsoft.com/office/drawing/2014/main" id="{3EA0C1BB-7DFA-4746-99C8-64EED33E39BD}"/>
+              </a:ext>
+            </a:extLst>
+          </p:cNvPr>
+          <p:cNvSpPr/>
+          <p:nvPr/>
+        </p:nvSpPr>
+        <p:spPr>
+          <a:xfrm>
+            <a:off x="5171838" y="4724642"/>
+            <a:ext cx="1848323" cy="312275"/>
+          </a:xfrm>
+          <a:prstGeom prst="roundRect">
+            <a:avLst>
+              <a:gd name="adj" fmla="val 12230"/>
+            </a:avLst>
+          </a:prstGeom>
+          <a:solidFill>
+            <a:srgbClr val="00A5FA"/>
+          </a:solidFill>
+          <a:ln>
+            <a:solidFill>
+              <a:srgbClr val="00B0F0"/>
+            </a:solidFill>
+          </a:ln>
+        </p:spPr>
+        <p:style>
+          <a:lnRef idx="2">
+            <a:schemeClr val="accent1">
+              <a:shade val="50000"/>
+            </a:schemeClr>
+          </a:lnRef>
+          <a:fillRef idx="1">
+            <a:schemeClr val="accent1"/>
+          </a:fillRef>
+          <a:effectRef idx="0">
+            <a:schemeClr val="accent1"/>
+          </a:effectRef>
+          <a:fontRef idx="minor">
+            <a:schemeClr val="lt1"/>
+          </a:fontRef>
+        </p:style>
+        <p:txBody>
+          <a:bodyPr rot="0" spcFirstLastPara="0" vertOverflow="overflow" horzOverflow="overflow" vert="horz" wrap="square" lIns="91440" tIns="45720" rIns="91440" bIns="45720" numCol="1" spcCol="0" rtlCol="0" fromWordArt="0" anchor="ctr" anchorCtr="0" forceAA="0" compatLnSpc="1">
+            <a:prstTxWarp prst="textNoShape">
+              <a:avLst/>
+            </a:prstTxWarp>
+            <a:noAutofit/>
+          </a:bodyPr>
+          <a:lstStyle/>
+          <a:p>
+            <a:pPr algn="ctr"/>
+            <a:r>
+              <a:rPr kumimoji="1" lang="ko-KR" altLang="en-US" sz="1000" b="1" dirty="0">
+                <a:solidFill>
+                  <a:schemeClr val="bg1"/>
+                </a:solidFill>
+              </a:rPr>
+              <a:t>비회원 입장</a:t>
+            </a:r>
+          </a:p>
+        </p:txBody>
+      </p:sp>
+    </p:spTree>
+    <p:extLst>
+      <p:ext uri="{BB962C8B-B14F-4D97-AF65-F5344CB8AC3E}">
+        <p14:creationId xmlns:p14="http://schemas.microsoft.com/office/powerpoint/2010/main" val="2207132643"/>
+      </p:ext>
+    </p:extLst>
+  </p:cSld>
+  <p:clrMapOvr>
+    <a:masterClrMapping/>
+  </p:clrMapOvr>
+</p:sld>
+</file>
+
+<file path=ppt/slides/slide7.xml><?xml version="1.0" encoding="utf-8"?>
+<p:sld xmlns:a="http://schemas.openxmlformats.org/drawingml/2006/main" xmlns:r="http://schemas.openxmlformats.org/officeDocument/2006/relationships" xmlns:p="http://schemas.openxmlformats.org/presentationml/2006/main">
+  <p:cSld>
+    <p:spTree>
+      <p:nvGrpSpPr>
+        <p:cNvPr id="1" name=""/>
+        <p:cNvGrpSpPr/>
+        <p:nvPr/>
+      </p:nvGrpSpPr>
+      <p:grpSpPr>
+        <a:xfrm>
+          <a:off x="0" y="0"/>
+          <a:ext cx="0" cy="0"/>
+          <a:chOff x="0" y="0"/>
+          <a:chExt cx="0" cy="0"/>
+        </a:xfrm>
+      </p:grpSpPr>
+      <p:sp>
+        <p:nvSpPr>
+          <p:cNvPr id="22" name="직사각형 21">
+            <a:extLst>
+              <a:ext uri="{FF2B5EF4-FFF2-40B4-BE49-F238E27FC236}">
+                <a16:creationId xmlns:a16="http://schemas.microsoft.com/office/drawing/2014/main" id="{67DAD890-3198-BA45-93A2-9FC369045AAE}"/>
+              </a:ext>
+            </a:extLst>
+          </p:cNvPr>
+          <p:cNvSpPr/>
+          <p:nvPr/>
+        </p:nvSpPr>
+        <p:spPr>
+          <a:xfrm>
+            <a:off x="4894025" y="1312130"/>
+            <a:ext cx="2403951" cy="2333999"/>
+          </a:xfrm>
+          <a:prstGeom prst="rect">
+            <a:avLst/>
+          </a:prstGeom>
+          <a:solidFill>
+            <a:schemeClr val="bg1"/>
+          </a:solidFill>
+          <a:ln>
+            <a:solidFill>
+              <a:schemeClr val="bg1">
+                <a:lumMod val="75000"/>
+              </a:schemeClr>
+            </a:solidFill>
+          </a:ln>
+        </p:spPr>
+        <p:style>
+          <a:lnRef idx="2">
+            <a:schemeClr val="accent1">
+              <a:shade val="50000"/>
+            </a:schemeClr>
+          </a:lnRef>
+          <a:fillRef idx="1">
+            <a:schemeClr val="accent1"/>
+          </a:fillRef>
+          <a:effectRef idx="0">
+            <a:schemeClr val="accent1"/>
+          </a:effectRef>
+          <a:fontRef idx="minor">
+            <a:schemeClr val="lt1"/>
+          </a:fontRef>
+        </p:style>
+        <p:txBody>
+          <a:bodyPr rtlCol="0" anchor="ctr"/>
+          <a:lstStyle/>
+          <a:p>
+            <a:pPr algn="ctr"/>
+            <a:endParaRPr kumimoji="1" lang="ko-KR" altLang="en-US" dirty="0"/>
+          </a:p>
+        </p:txBody>
+      </p:sp>
+      <p:sp>
+        <p:nvSpPr>
+          <p:cNvPr id="23" name="TextBox 22">
+            <a:extLst>
+              <a:ext uri="{FF2B5EF4-FFF2-40B4-BE49-F238E27FC236}">
+                <a16:creationId xmlns:a16="http://schemas.microsoft.com/office/drawing/2014/main" id="{0A800E18-9E00-4141-8070-3B6B1C9ADF94}"/>
+              </a:ext>
+            </a:extLst>
+          </p:cNvPr>
+          <p:cNvSpPr txBox="1"/>
+          <p:nvPr/>
+        </p:nvSpPr>
+        <p:spPr>
+          <a:xfrm>
+            <a:off x="5695893" y="1465272"/>
+            <a:ext cx="800219" cy="584775"/>
+          </a:xfrm>
+          <a:prstGeom prst="rect">
+            <a:avLst/>
+          </a:prstGeom>
+          <a:noFill/>
+        </p:spPr>
+        <p:txBody>
+          <a:bodyPr wrap="none" rtlCol="0">
+            <a:spAutoFit/>
+          </a:bodyPr>
+          <a:lstStyle/>
+          <a:p>
+            <a:pPr algn="ctr"/>
+            <a:r>
+              <a:rPr kumimoji="1" lang="ko-KR" altLang="en-US" sz="1600" b="1" dirty="0"/>
+              <a:t>활빈당</a:t>
+            </a:r>
+            <a:endParaRPr kumimoji="1" lang="en-US" altLang="ko-KR" sz="1600" b="1" dirty="0"/>
+          </a:p>
+          <a:p>
+            <a:pPr algn="ctr"/>
+            <a:r>
+              <a:rPr kumimoji="1" lang="ko-KR" altLang="en-US" sz="1600" b="1" dirty="0"/>
+              <a:t>입장</a:t>
+            </a:r>
+          </a:p>
+        </p:txBody>
+      </p:sp>
+      <p:sp>
+        <p:nvSpPr>
+          <p:cNvPr id="10" name="모서리가 둥근 직사각형 9">
+            <a:extLst>
+              <a:ext uri="{FF2B5EF4-FFF2-40B4-BE49-F238E27FC236}">
+                <a16:creationId xmlns:a16="http://schemas.microsoft.com/office/drawing/2014/main" id="{C5146231-6C8A-1246-B88B-938550474F2E}"/>
+              </a:ext>
+            </a:extLst>
+          </p:cNvPr>
+          <p:cNvSpPr/>
+          <p:nvPr/>
+        </p:nvSpPr>
+        <p:spPr>
+          <a:xfrm>
+            <a:off x="5171838" y="2489791"/>
+            <a:ext cx="1848323" cy="234616"/>
+          </a:xfrm>
+          <a:prstGeom prst="roundRect">
+            <a:avLst>
+              <a:gd name="adj" fmla="val 12230"/>
+            </a:avLst>
+          </a:prstGeom>
+          <a:solidFill>
+            <a:srgbClr val="F6F6F6"/>
+          </a:solidFill>
+          <a:ln>
+            <a:solidFill>
+              <a:schemeClr val="bg1">
+                <a:lumMod val="75000"/>
+              </a:schemeClr>
+            </a:solidFill>
+          </a:ln>
+        </p:spPr>
+        <p:style>
+          <a:lnRef idx="2">
+            <a:schemeClr val="accent1">
+              <a:shade val="50000"/>
+            </a:schemeClr>
+          </a:lnRef>
+          <a:fillRef idx="1">
+            <a:schemeClr val="accent1"/>
+          </a:fillRef>
+          <a:effectRef idx="0">
+            <a:schemeClr val="accent1"/>
+          </a:effectRef>
+          <a:fontRef idx="minor">
+            <a:schemeClr val="lt1"/>
+          </a:fontRef>
+        </p:style>
+        <p:txBody>
+          <a:bodyPr rot="0" spcFirstLastPara="0" vertOverflow="overflow" horzOverflow="overflow" vert="horz" wrap="square" lIns="91440" tIns="45720" rIns="91440" bIns="45720" numCol="1" spcCol="0" rtlCol="0" fromWordArt="0" anchor="ctr" anchorCtr="0" forceAA="0" compatLnSpc="1">
+            <a:prstTxWarp prst="textNoShape">
+              <a:avLst/>
+            </a:prstTxWarp>
+            <a:noAutofit/>
+          </a:bodyPr>
+          <a:lstStyle/>
+          <a:p>
+            <a:pPr algn="ctr"/>
+            <a:r>
+              <a:rPr kumimoji="1" lang="en-US" altLang="ko-KR" sz="1000" dirty="0">
+                <a:solidFill>
+                  <a:schemeClr val="bg1">
+                    <a:lumMod val="50000"/>
+                  </a:schemeClr>
+                </a:solidFill>
+              </a:rPr>
+              <a:t>Password</a:t>
+            </a:r>
+            <a:endParaRPr kumimoji="1" lang="ko-KR" altLang="en-US" sz="1000" dirty="0">
+              <a:solidFill>
+                <a:schemeClr val="bg1">
+                  <a:lumMod val="50000"/>
+                </a:schemeClr>
+              </a:solidFill>
+            </a:endParaRPr>
+          </a:p>
+        </p:txBody>
+      </p:sp>
+      <p:sp>
+        <p:nvSpPr>
+          <p:cNvPr id="11" name="모서리가 둥근 직사각형 10">
+            <a:extLst>
+              <a:ext uri="{FF2B5EF4-FFF2-40B4-BE49-F238E27FC236}">
+                <a16:creationId xmlns:a16="http://schemas.microsoft.com/office/drawing/2014/main" id="{431DDE67-59BE-C741-A92A-B9FDB6578F05}"/>
+              </a:ext>
+            </a:extLst>
+          </p:cNvPr>
+          <p:cNvSpPr/>
+          <p:nvPr/>
+        </p:nvSpPr>
+        <p:spPr>
+          <a:xfrm>
+            <a:off x="5171838" y="2184991"/>
+            <a:ext cx="1848323" cy="234616"/>
+          </a:xfrm>
+          <a:prstGeom prst="roundRect">
+            <a:avLst>
+              <a:gd name="adj" fmla="val 12230"/>
+            </a:avLst>
+          </a:prstGeom>
+          <a:solidFill>
+            <a:srgbClr val="F6F6F6"/>
+          </a:solidFill>
+          <a:ln>
+            <a:solidFill>
+              <a:schemeClr val="bg1">
+                <a:lumMod val="75000"/>
+              </a:schemeClr>
+            </a:solidFill>
+          </a:ln>
+        </p:spPr>
+        <p:style>
+          <a:lnRef idx="2">
+            <a:schemeClr val="accent1">
+              <a:shade val="50000"/>
+            </a:schemeClr>
+          </a:lnRef>
+          <a:fillRef idx="1">
+            <a:schemeClr val="accent1"/>
+          </a:fillRef>
+          <a:effectRef idx="0">
+            <a:schemeClr val="accent1"/>
+          </a:effectRef>
+          <a:fontRef idx="minor">
+            <a:schemeClr val="lt1"/>
+          </a:fontRef>
+        </p:style>
+        <p:txBody>
+          <a:bodyPr rot="0" spcFirstLastPara="0" vertOverflow="overflow" horzOverflow="overflow" vert="horz" wrap="square" lIns="91440" tIns="45720" rIns="91440" bIns="45720" numCol="1" spcCol="0" rtlCol="0" fromWordArt="0" anchor="ctr" anchorCtr="0" forceAA="0" compatLnSpc="1">
+            <a:prstTxWarp prst="textNoShape">
+              <a:avLst/>
+            </a:prstTxWarp>
+            <a:noAutofit/>
+          </a:bodyPr>
+          <a:lstStyle/>
+          <a:p>
+            <a:pPr algn="ctr"/>
+            <a:r>
+              <a:rPr kumimoji="1" lang="en-US" altLang="ko-KR" sz="1000" dirty="0">
+                <a:solidFill>
+                  <a:schemeClr val="bg1">
+                    <a:lumMod val="50000"/>
+                  </a:schemeClr>
+                </a:solidFill>
+              </a:rPr>
+              <a:t>Username</a:t>
+            </a:r>
+            <a:endParaRPr kumimoji="1" lang="ko-KR" altLang="en-US" sz="1000" dirty="0">
+              <a:solidFill>
+                <a:schemeClr val="bg1">
+                  <a:lumMod val="50000"/>
+                </a:schemeClr>
+              </a:solidFill>
+            </a:endParaRPr>
+          </a:p>
+        </p:txBody>
+      </p:sp>
+      <p:sp>
+        <p:nvSpPr>
+          <p:cNvPr id="12" name="모서리가 둥근 직사각형 11">
+            <a:extLst>
+              <a:ext uri="{FF2B5EF4-FFF2-40B4-BE49-F238E27FC236}">
+                <a16:creationId xmlns:a16="http://schemas.microsoft.com/office/drawing/2014/main" id="{C5488FC6-282C-7148-82F7-288317848D5E}"/>
+              </a:ext>
+            </a:extLst>
+          </p:cNvPr>
+          <p:cNvSpPr/>
+          <p:nvPr/>
+        </p:nvSpPr>
+        <p:spPr>
+          <a:xfrm>
+            <a:off x="5171838" y="3121959"/>
+            <a:ext cx="1848323" cy="234616"/>
+          </a:xfrm>
+          <a:prstGeom prst="roundRect">
+            <a:avLst>
+              <a:gd name="adj" fmla="val 12230"/>
+            </a:avLst>
+          </a:prstGeom>
+          <a:solidFill>
+            <a:srgbClr val="00A5FA"/>
+          </a:solidFill>
+          <a:ln>
+            <a:solidFill>
+              <a:srgbClr val="00B0F0"/>
+            </a:solidFill>
+          </a:ln>
+        </p:spPr>
+        <p:style>
+          <a:lnRef idx="2">
+            <a:schemeClr val="accent1">
+              <a:shade val="50000"/>
+            </a:schemeClr>
+          </a:lnRef>
+          <a:fillRef idx="1">
+            <a:schemeClr val="accent1"/>
+          </a:fillRef>
+          <a:effectRef idx="0">
+            <a:schemeClr val="accent1"/>
+          </a:effectRef>
+          <a:fontRef idx="minor">
+            <a:schemeClr val="lt1"/>
+          </a:fontRef>
+        </p:style>
+        <p:txBody>
+          <a:bodyPr rot="0" spcFirstLastPara="0" vertOverflow="overflow" horzOverflow="overflow" vert="horz" wrap="square" lIns="91440" tIns="45720" rIns="91440" bIns="45720" numCol="1" spcCol="0" rtlCol="0" fromWordArt="0" anchor="ctr" anchorCtr="0" forceAA="0" compatLnSpc="1">
+            <a:prstTxWarp prst="textNoShape">
+              <a:avLst/>
+            </a:prstTxWarp>
+            <a:noAutofit/>
+          </a:bodyPr>
+          <a:lstStyle/>
+          <a:p>
+            <a:pPr algn="ctr"/>
+            <a:r>
+              <a:rPr kumimoji="1" lang="ko-KR" altLang="en-US" sz="1000" dirty="0">
+                <a:solidFill>
+                  <a:schemeClr val="bg1"/>
+                </a:solidFill>
+              </a:rPr>
+              <a:t>로그인</a:t>
+            </a:r>
+          </a:p>
+        </p:txBody>
+      </p:sp>
+      <p:sp>
+        <p:nvSpPr>
+          <p:cNvPr id="17" name="모서리가 둥근 직사각형 16">
+            <a:extLst>
+              <a:ext uri="{FF2B5EF4-FFF2-40B4-BE49-F238E27FC236}">
+                <a16:creationId xmlns:a16="http://schemas.microsoft.com/office/drawing/2014/main" id="{E2BABE5E-2C5B-1544-9595-954E364F1BF3}"/>
+              </a:ext>
+            </a:extLst>
+          </p:cNvPr>
+          <p:cNvSpPr/>
+          <p:nvPr/>
+        </p:nvSpPr>
+        <p:spPr>
+          <a:xfrm>
+            <a:off x="5171838" y="2788037"/>
+            <a:ext cx="1848323" cy="234616"/>
+          </a:xfrm>
+          <a:prstGeom prst="roundRect">
+            <a:avLst>
+              <a:gd name="adj" fmla="val 12230"/>
+            </a:avLst>
+          </a:prstGeom>
+          <a:solidFill>
+            <a:srgbClr val="F6F6F6"/>
+          </a:solidFill>
+          <a:ln>
+            <a:solidFill>
+              <a:schemeClr val="bg1">
+                <a:lumMod val="75000"/>
+              </a:schemeClr>
+            </a:solidFill>
+          </a:ln>
+        </p:spPr>
+        <p:style>
+          <a:lnRef idx="2">
+            <a:schemeClr val="accent1">
+              <a:shade val="50000"/>
+            </a:schemeClr>
+          </a:lnRef>
+          <a:fillRef idx="1">
+            <a:schemeClr val="accent1"/>
+          </a:fillRef>
+          <a:effectRef idx="0">
+            <a:schemeClr val="accent1"/>
+          </a:effectRef>
+          <a:fontRef idx="minor">
+            <a:schemeClr val="lt1"/>
+          </a:fontRef>
+        </p:style>
+        <p:txBody>
+          <a:bodyPr rot="0" spcFirstLastPara="0" vertOverflow="overflow" horzOverflow="overflow" vert="horz" wrap="square" lIns="91440" tIns="45720" rIns="91440" bIns="45720" numCol="1" spcCol="0" rtlCol="0" fromWordArt="0" anchor="ctr" anchorCtr="0" forceAA="0" compatLnSpc="1">
+            <a:prstTxWarp prst="textNoShape">
+              <a:avLst/>
+            </a:prstTxWarp>
+            <a:noAutofit/>
+          </a:bodyPr>
+          <a:lstStyle/>
+          <a:p>
+            <a:pPr algn="ctr"/>
+            <a:r>
+              <a:rPr kumimoji="1" lang="en-US" altLang="ko-KR" sz="1000" dirty="0">
+                <a:solidFill>
+                  <a:schemeClr val="bg1">
+                    <a:lumMod val="50000"/>
+                  </a:schemeClr>
+                </a:solidFill>
+              </a:rPr>
+              <a:t>Confirm Password</a:t>
+            </a:r>
+            <a:endParaRPr kumimoji="1" lang="ko-KR" altLang="en-US" sz="1000" dirty="0">
+              <a:solidFill>
+                <a:schemeClr val="bg1">
+                  <a:lumMod val="50000"/>
+                </a:schemeClr>
+              </a:solidFill>
+            </a:endParaRPr>
+          </a:p>
+        </p:txBody>
+      </p:sp>
+      <p:sp>
+        <p:nvSpPr>
+          <p:cNvPr id="13" name="직사각형 12">
+            <a:extLst>
+              <a:ext uri="{FF2B5EF4-FFF2-40B4-BE49-F238E27FC236}">
+                <a16:creationId xmlns:a16="http://schemas.microsoft.com/office/drawing/2014/main" id="{C1198BDD-CC97-3E43-A063-3FFF1B53F206}"/>
+              </a:ext>
+            </a:extLst>
+          </p:cNvPr>
+          <p:cNvSpPr/>
+          <p:nvPr/>
+        </p:nvSpPr>
+        <p:spPr>
+          <a:xfrm>
+            <a:off x="4894025" y="3716313"/>
+            <a:ext cx="2403951" cy="722021"/>
+          </a:xfrm>
+          <a:prstGeom prst="rect">
+            <a:avLst/>
+          </a:prstGeom>
+          <a:solidFill>
+            <a:schemeClr val="bg1"/>
+          </a:solidFill>
+          <a:ln>
+            <a:solidFill>
+              <a:schemeClr val="bg1">
+                <a:lumMod val="75000"/>
+              </a:schemeClr>
+            </a:solidFill>
+          </a:ln>
+        </p:spPr>
+        <p:style>
+          <a:lnRef idx="2">
+            <a:schemeClr val="accent1">
+              <a:shade val="50000"/>
+            </a:schemeClr>
+          </a:lnRef>
+          <a:fillRef idx="1">
+            <a:schemeClr val="accent1"/>
+          </a:fillRef>
+          <a:effectRef idx="0">
+            <a:schemeClr val="accent1"/>
+          </a:effectRef>
+          <a:fontRef idx="minor">
+            <a:schemeClr val="lt1"/>
+          </a:fontRef>
+        </p:style>
+        <p:txBody>
+          <a:bodyPr rtlCol="0" anchor="ctr"/>
+          <a:lstStyle/>
+          <a:p>
+            <a:pPr algn="ctr"/>
+            <a:endParaRPr kumimoji="1" lang="ko-KR" altLang="en-US" dirty="0"/>
+          </a:p>
+        </p:txBody>
+      </p:sp>
+      <p:sp>
+        <p:nvSpPr>
+          <p:cNvPr id="14" name="TextBox 13">
+            <a:extLst>
+              <a:ext uri="{FF2B5EF4-FFF2-40B4-BE49-F238E27FC236}">
+                <a16:creationId xmlns:a16="http://schemas.microsoft.com/office/drawing/2014/main" id="{2D75EC22-FEC0-1C47-B79E-BF8D3F36BC3B}"/>
+              </a:ext>
+            </a:extLst>
+          </p:cNvPr>
+          <p:cNvSpPr txBox="1"/>
+          <p:nvPr/>
+        </p:nvSpPr>
+        <p:spPr>
+          <a:xfrm>
+            <a:off x="5080206" y="3890953"/>
+            <a:ext cx="2045753" cy="246221"/>
+          </a:xfrm>
+          <a:prstGeom prst="rect">
+            <a:avLst/>
+          </a:prstGeom>
+          <a:noFill/>
+        </p:spPr>
+        <p:txBody>
+          <a:bodyPr wrap="none" rtlCol="0">
+            <a:spAutoFit/>
+          </a:bodyPr>
+          <a:lstStyle/>
+          <a:p>
+            <a:pPr algn="ctr"/>
+            <a:r>
+              <a:rPr kumimoji="1" lang="ko-KR" altLang="en-US" sz="1000" dirty="0"/>
+              <a:t>있는 계정을 사용하려면</a:t>
+            </a:r>
+            <a:r>
+              <a:rPr kumimoji="1" lang="en-US" altLang="ko-KR" sz="1000" dirty="0"/>
+              <a:t>?</a:t>
+            </a:r>
+            <a:r>
+              <a:rPr kumimoji="1" lang="ko-KR" altLang="en-US" sz="1000" dirty="0"/>
+              <a:t> </a:t>
+            </a:r>
+            <a:r>
+              <a:rPr kumimoji="1" lang="ko-KR" altLang="en-US" sz="1000" dirty="0">
+                <a:solidFill>
+                  <a:srgbClr val="00B0F0"/>
+                </a:solidFill>
+              </a:rPr>
+              <a:t>로그인</a:t>
+            </a:r>
+          </a:p>
+        </p:txBody>
+      </p:sp>
+      <p:sp>
+        <p:nvSpPr>
+          <p:cNvPr id="15" name="TextBox 14">
+            <a:extLst>
+              <a:ext uri="{FF2B5EF4-FFF2-40B4-BE49-F238E27FC236}">
+                <a16:creationId xmlns:a16="http://schemas.microsoft.com/office/drawing/2014/main" id="{4B6ED008-8A6C-074B-B622-68BE2BA06CC7}"/>
+              </a:ext>
+            </a:extLst>
+          </p:cNvPr>
+          <p:cNvSpPr txBox="1"/>
+          <p:nvPr/>
+        </p:nvSpPr>
+        <p:spPr>
+          <a:xfrm>
+            <a:off x="5525535" y="4131895"/>
+            <a:ext cx="1141659" cy="253916"/>
+          </a:xfrm>
+          <a:prstGeom prst="rect">
+            <a:avLst/>
+          </a:prstGeom>
+          <a:noFill/>
+        </p:spPr>
+        <p:txBody>
+          <a:bodyPr wrap="none" rtlCol="0">
+            <a:spAutoFit/>
+          </a:bodyPr>
+          <a:lstStyle/>
+          <a:p>
+            <a:r>
+              <a:rPr kumimoji="1" lang="en-US" altLang="ko-KR" sz="1050" dirty="0">
+                <a:solidFill>
+                  <a:schemeClr val="bg1">
+                    <a:lumMod val="50000"/>
+                  </a:schemeClr>
+                </a:solidFill>
+              </a:rPr>
+              <a:t>@ </a:t>
+            </a:r>
+            <a:r>
+              <a:rPr kumimoji="1" lang="en-US" altLang="ko-KR" sz="1050" dirty="0" err="1">
+                <a:solidFill>
+                  <a:schemeClr val="bg1">
+                    <a:lumMod val="50000"/>
+                  </a:schemeClr>
+                </a:solidFill>
+              </a:rPr>
+              <a:t>about_JCube</a:t>
+            </a:r>
+            <a:endParaRPr kumimoji="1" lang="en-US" altLang="ko-KR" sz="1050" dirty="0">
+              <a:solidFill>
+                <a:schemeClr val="bg1">
+                  <a:lumMod val="50000"/>
+                </a:schemeClr>
+              </a:solidFill>
+            </a:endParaRPr>
+          </a:p>
+        </p:txBody>
+      </p:sp>
+      <p:sp>
+        <p:nvSpPr>
+          <p:cNvPr id="16" name="직사각형 15">
+            <a:extLst>
+              <a:ext uri="{FF2B5EF4-FFF2-40B4-BE49-F238E27FC236}">
+                <a16:creationId xmlns:a16="http://schemas.microsoft.com/office/drawing/2014/main" id="{C2A1CFDE-104A-6548-A6F5-86CCCD43C3C6}"/>
+              </a:ext>
+            </a:extLst>
+          </p:cNvPr>
+          <p:cNvSpPr/>
+          <p:nvPr/>
+        </p:nvSpPr>
+        <p:spPr>
+          <a:xfrm>
+            <a:off x="4894025" y="4519769"/>
+            <a:ext cx="2403951" cy="722021"/>
+          </a:xfrm>
+          <a:prstGeom prst="rect">
+            <a:avLst/>
+          </a:prstGeom>
+          <a:solidFill>
+            <a:schemeClr val="bg1"/>
+          </a:solidFill>
+          <a:ln>
+            <a:solidFill>
+              <a:schemeClr val="bg1">
+                <a:lumMod val="75000"/>
+              </a:schemeClr>
+            </a:solidFill>
+          </a:ln>
+        </p:spPr>
+        <p:style>
+          <a:lnRef idx="2">
+            <a:schemeClr val="accent1">
+              <a:shade val="50000"/>
+            </a:schemeClr>
+          </a:lnRef>
+          <a:fillRef idx="1">
+            <a:schemeClr val="accent1"/>
+          </a:fillRef>
+          <a:effectRef idx="0">
+            <a:schemeClr val="accent1"/>
+          </a:effectRef>
+          <a:fontRef idx="minor">
+            <a:schemeClr val="lt1"/>
+          </a:fontRef>
+        </p:style>
+        <p:txBody>
+          <a:bodyPr rtlCol="0" anchor="ctr"/>
+          <a:lstStyle/>
+          <a:p>
+            <a:pPr algn="ctr"/>
+            <a:endParaRPr kumimoji="1" lang="ko-KR" altLang="en-US" dirty="0"/>
+          </a:p>
+        </p:txBody>
+      </p:sp>
+      <p:sp>
+        <p:nvSpPr>
+          <p:cNvPr id="21" name="모서리가 둥근 직사각형 20">
+            <a:extLst>
+              <a:ext uri="{FF2B5EF4-FFF2-40B4-BE49-F238E27FC236}">
+                <a16:creationId xmlns:a16="http://schemas.microsoft.com/office/drawing/2014/main" id="{EA113DB3-6898-EF41-A8EF-F40F5C1C3CAA}"/>
+              </a:ext>
+            </a:extLst>
+          </p:cNvPr>
+          <p:cNvSpPr/>
+          <p:nvPr/>
+        </p:nvSpPr>
+        <p:spPr>
+          <a:xfrm>
+            <a:off x="5171838" y="4724642"/>
+            <a:ext cx="1848323" cy="312275"/>
+          </a:xfrm>
+          <a:prstGeom prst="roundRect">
+            <a:avLst>
+              <a:gd name="adj" fmla="val 12230"/>
+            </a:avLst>
+          </a:prstGeom>
+          <a:solidFill>
+            <a:srgbClr val="00A5FA"/>
+          </a:solidFill>
+          <a:ln>
+            <a:solidFill>
+              <a:srgbClr val="00B0F0"/>
+            </a:solidFill>
+          </a:ln>
+        </p:spPr>
+        <p:style>
+          <a:lnRef idx="2">
+            <a:schemeClr val="accent1">
+              <a:shade val="50000"/>
+            </a:schemeClr>
+          </a:lnRef>
+          <a:fillRef idx="1">
+            <a:schemeClr val="accent1"/>
+          </a:fillRef>
+          <a:effectRef idx="0">
+            <a:schemeClr val="accent1"/>
+          </a:effectRef>
+          <a:fontRef idx="minor">
+            <a:schemeClr val="lt1"/>
+          </a:fontRef>
+        </p:style>
+        <p:txBody>
+          <a:bodyPr rot="0" spcFirstLastPara="0" vertOverflow="overflow" horzOverflow="overflow" vert="horz" wrap="square" lIns="91440" tIns="45720" rIns="91440" bIns="45720" numCol="1" spcCol="0" rtlCol="0" fromWordArt="0" anchor="ctr" anchorCtr="0" forceAA="0" compatLnSpc="1">
+            <a:prstTxWarp prst="textNoShape">
+              <a:avLst/>
+            </a:prstTxWarp>
+            <a:noAutofit/>
+          </a:bodyPr>
+          <a:lstStyle/>
+          <a:p>
+            <a:pPr algn="ctr"/>
+            <a:r>
+              <a:rPr kumimoji="1" lang="ko-KR" altLang="en-US" sz="1000" b="1" dirty="0">
+                <a:solidFill>
+                  <a:schemeClr val="bg1"/>
+                </a:solidFill>
+              </a:rPr>
+              <a:t>비회원 입장</a:t>
+            </a:r>
+          </a:p>
+        </p:txBody>
+      </p:sp>
+    </p:spTree>
+    <p:extLst>
+      <p:ext uri="{BB962C8B-B14F-4D97-AF65-F5344CB8AC3E}">
+        <p14:creationId xmlns:p14="http://schemas.microsoft.com/office/powerpoint/2010/main" val="3964479482"/>
+      </p:ext>
+    </p:extLst>
+  </p:cSld>
+  <p:clrMapOvr>
+    <a:masterClrMapping/>
+  </p:clrMapOvr>
+</p:sld>
+</file>
+
+<file path=ppt/slides/slide8.xml><?xml version="1.0" encoding="utf-8"?>
+<p:sld xmlns:a="http://schemas.openxmlformats.org/drawingml/2006/main" xmlns:r="http://schemas.openxmlformats.org/officeDocument/2006/relationships" xmlns:p="http://schemas.openxmlformats.org/presentationml/2006/main">
+  <p:cSld>
+    <p:spTree>
+      <p:nvGrpSpPr>
+        <p:cNvPr id="1" name=""/>
+        <p:cNvGrpSpPr/>
+        <p:nvPr/>
+      </p:nvGrpSpPr>
+      <p:grpSpPr>
+        <a:xfrm>
+          <a:off x="0" y="0"/>
+          <a:ext cx="0" cy="0"/>
+          <a:chOff x="0" y="0"/>
+          <a:chExt cx="0" cy="0"/>
+        </a:xfrm>
+      </p:grpSpPr>
+      <p:sp>
+        <p:nvSpPr>
+          <p:cNvPr id="22" name="직사각형 21">
+            <a:extLst>
+              <a:ext uri="{FF2B5EF4-FFF2-40B4-BE49-F238E27FC236}">
+                <a16:creationId xmlns:a16="http://schemas.microsoft.com/office/drawing/2014/main" id="{67DAD890-3198-BA45-93A2-9FC369045AAE}"/>
+              </a:ext>
+            </a:extLst>
+          </p:cNvPr>
+          <p:cNvSpPr/>
+          <p:nvPr/>
+        </p:nvSpPr>
+        <p:spPr>
+          <a:xfrm>
+            <a:off x="4894025" y="1312130"/>
+            <a:ext cx="2403951" cy="2333999"/>
+          </a:xfrm>
+          <a:prstGeom prst="rect">
+            <a:avLst/>
+          </a:prstGeom>
+          <a:solidFill>
+            <a:schemeClr val="bg1"/>
+          </a:solidFill>
+          <a:ln>
+            <a:solidFill>
+              <a:schemeClr val="bg1">
+                <a:lumMod val="75000"/>
+              </a:schemeClr>
+            </a:solidFill>
+          </a:ln>
+        </p:spPr>
+        <p:style>
+          <a:lnRef idx="2">
+            <a:schemeClr val="accent1">
+              <a:shade val="50000"/>
+            </a:schemeClr>
+          </a:lnRef>
+          <a:fillRef idx="1">
+            <a:schemeClr val="accent1"/>
+          </a:fillRef>
+          <a:effectRef idx="0">
+            <a:schemeClr val="accent1"/>
+          </a:effectRef>
+          <a:fontRef idx="minor">
+            <a:schemeClr val="lt1"/>
+          </a:fontRef>
+        </p:style>
+        <p:txBody>
+          <a:bodyPr rtlCol="0" anchor="ctr"/>
+          <a:lstStyle/>
+          <a:p>
+            <a:pPr algn="ctr"/>
+            <a:endParaRPr kumimoji="1" lang="ko-KR" altLang="en-US" dirty="0"/>
+          </a:p>
+        </p:txBody>
+      </p:sp>
+      <p:sp>
+        <p:nvSpPr>
+          <p:cNvPr id="23" name="TextBox 22">
+            <a:extLst>
+              <a:ext uri="{FF2B5EF4-FFF2-40B4-BE49-F238E27FC236}">
+                <a16:creationId xmlns:a16="http://schemas.microsoft.com/office/drawing/2014/main" id="{0A800E18-9E00-4141-8070-3B6B1C9ADF94}"/>
+              </a:ext>
+            </a:extLst>
+          </p:cNvPr>
+          <p:cNvSpPr txBox="1"/>
+          <p:nvPr/>
+        </p:nvSpPr>
+        <p:spPr>
+          <a:xfrm>
+            <a:off x="5695893" y="1465272"/>
+            <a:ext cx="800219" cy="584775"/>
+          </a:xfrm>
+          <a:prstGeom prst="rect">
+            <a:avLst/>
+          </a:prstGeom>
+          <a:noFill/>
+        </p:spPr>
+        <p:txBody>
+          <a:bodyPr wrap="none" rtlCol="0">
+            <a:spAutoFit/>
+          </a:bodyPr>
+          <a:lstStyle/>
+          <a:p>
+            <a:pPr algn="ctr"/>
+            <a:r>
+              <a:rPr kumimoji="1" lang="ko-KR" altLang="en-US" sz="1600" b="1" dirty="0"/>
+              <a:t>활빈당</a:t>
+            </a:r>
+            <a:endParaRPr kumimoji="1" lang="en-US" altLang="ko-KR" sz="1600" b="1" dirty="0"/>
+          </a:p>
+          <a:p>
+            <a:pPr algn="ctr"/>
+            <a:r>
+              <a:rPr kumimoji="1" lang="ko-KR" altLang="en-US" sz="1600" b="1" dirty="0"/>
+              <a:t>입장</a:t>
+            </a:r>
+          </a:p>
+        </p:txBody>
+      </p:sp>
+      <p:sp>
+        <p:nvSpPr>
+          <p:cNvPr id="13" name="직사각형 12">
+            <a:extLst>
+              <a:ext uri="{FF2B5EF4-FFF2-40B4-BE49-F238E27FC236}">
+                <a16:creationId xmlns:a16="http://schemas.microsoft.com/office/drawing/2014/main" id="{C1198BDD-CC97-3E43-A063-3FFF1B53F206}"/>
+              </a:ext>
+            </a:extLst>
+          </p:cNvPr>
+          <p:cNvSpPr/>
+          <p:nvPr/>
+        </p:nvSpPr>
+        <p:spPr>
+          <a:xfrm>
+            <a:off x="4894025" y="3716313"/>
+            <a:ext cx="2403951" cy="722021"/>
+          </a:xfrm>
+          <a:prstGeom prst="rect">
+            <a:avLst/>
+          </a:prstGeom>
+          <a:solidFill>
+            <a:schemeClr val="bg1"/>
+          </a:solidFill>
+          <a:ln>
+            <a:solidFill>
+              <a:schemeClr val="bg1">
+                <a:lumMod val="75000"/>
+              </a:schemeClr>
+            </a:solidFill>
+          </a:ln>
+        </p:spPr>
+        <p:style>
+          <a:lnRef idx="2">
+            <a:schemeClr val="accent1">
+              <a:shade val="50000"/>
+            </a:schemeClr>
+          </a:lnRef>
+          <a:fillRef idx="1">
+            <a:schemeClr val="accent1"/>
+          </a:fillRef>
+          <a:effectRef idx="0">
+            <a:schemeClr val="accent1"/>
+          </a:effectRef>
+          <a:fontRef idx="minor">
+            <a:schemeClr val="lt1"/>
+          </a:fontRef>
+        </p:style>
+        <p:txBody>
+          <a:bodyPr rtlCol="0" anchor="ctr"/>
+          <a:lstStyle/>
+          <a:p>
+            <a:pPr algn="ctr"/>
+            <a:endParaRPr kumimoji="1" lang="ko-KR" altLang="en-US" dirty="0"/>
+          </a:p>
+        </p:txBody>
+      </p:sp>
+      <p:sp>
+        <p:nvSpPr>
+          <p:cNvPr id="14" name="TextBox 13">
+            <a:extLst>
+              <a:ext uri="{FF2B5EF4-FFF2-40B4-BE49-F238E27FC236}">
+                <a16:creationId xmlns:a16="http://schemas.microsoft.com/office/drawing/2014/main" id="{2D75EC22-FEC0-1C47-B79E-BF8D3F36BC3B}"/>
+              </a:ext>
+            </a:extLst>
+          </p:cNvPr>
+          <p:cNvSpPr txBox="1"/>
+          <p:nvPr/>
+        </p:nvSpPr>
+        <p:spPr>
+          <a:xfrm>
+            <a:off x="5080206" y="3890953"/>
+            <a:ext cx="2045753" cy="246221"/>
+          </a:xfrm>
+          <a:prstGeom prst="rect">
+            <a:avLst/>
+          </a:prstGeom>
+          <a:noFill/>
+        </p:spPr>
+        <p:txBody>
+          <a:bodyPr wrap="none" rtlCol="0">
+            <a:spAutoFit/>
+          </a:bodyPr>
+          <a:lstStyle/>
+          <a:p>
+            <a:pPr algn="ctr"/>
+            <a:r>
+              <a:rPr kumimoji="1" lang="ko-KR" altLang="en-US" sz="1000" dirty="0"/>
+              <a:t>다른 계정을 사용하려면</a:t>
+            </a:r>
+            <a:r>
+              <a:rPr kumimoji="1" lang="en-US" altLang="ko-KR" sz="1000" dirty="0"/>
+              <a:t>?</a:t>
+            </a:r>
+            <a:r>
+              <a:rPr kumimoji="1" lang="ko-KR" altLang="en-US" sz="1000" dirty="0"/>
+              <a:t> </a:t>
+            </a:r>
+            <a:r>
+              <a:rPr kumimoji="1" lang="ko-KR" altLang="en-US" sz="1000" dirty="0">
+                <a:solidFill>
+                  <a:srgbClr val="00B0F0"/>
+                </a:solidFill>
+              </a:rPr>
+              <a:t>로그인</a:t>
+            </a:r>
+          </a:p>
+        </p:txBody>
+      </p:sp>
+      <p:sp>
+        <p:nvSpPr>
+          <p:cNvPr id="15" name="TextBox 14">
+            <a:extLst>
+              <a:ext uri="{FF2B5EF4-FFF2-40B4-BE49-F238E27FC236}">
+                <a16:creationId xmlns:a16="http://schemas.microsoft.com/office/drawing/2014/main" id="{4B6ED008-8A6C-074B-B622-68BE2BA06CC7}"/>
+              </a:ext>
+            </a:extLst>
+          </p:cNvPr>
+          <p:cNvSpPr txBox="1"/>
+          <p:nvPr/>
+        </p:nvSpPr>
+        <p:spPr>
+          <a:xfrm>
+            <a:off x="5525535" y="4131895"/>
+            <a:ext cx="1141659" cy="253916"/>
+          </a:xfrm>
+          <a:prstGeom prst="rect">
+            <a:avLst/>
+          </a:prstGeom>
+          <a:noFill/>
+        </p:spPr>
+        <p:txBody>
+          <a:bodyPr wrap="none" rtlCol="0">
+            <a:spAutoFit/>
+          </a:bodyPr>
+          <a:lstStyle/>
+          <a:p>
+            <a:r>
+              <a:rPr kumimoji="1" lang="en-US" altLang="ko-KR" sz="1050" dirty="0">
+                <a:solidFill>
+                  <a:schemeClr val="bg1">
+                    <a:lumMod val="50000"/>
+                  </a:schemeClr>
+                </a:solidFill>
+              </a:rPr>
+              <a:t>@ </a:t>
+            </a:r>
+            <a:r>
+              <a:rPr kumimoji="1" lang="en-US" altLang="ko-KR" sz="1050" dirty="0" err="1">
+                <a:solidFill>
+                  <a:schemeClr val="bg1">
+                    <a:lumMod val="50000"/>
+                  </a:schemeClr>
+                </a:solidFill>
+              </a:rPr>
+              <a:t>about_JCube</a:t>
+            </a:r>
+            <a:endParaRPr kumimoji="1" lang="en-US" altLang="ko-KR" sz="1050" dirty="0">
+              <a:solidFill>
+                <a:schemeClr val="bg1">
+                  <a:lumMod val="50000"/>
+                </a:schemeClr>
+              </a:solidFill>
+            </a:endParaRPr>
+          </a:p>
+        </p:txBody>
+      </p:sp>
+      <p:sp>
+        <p:nvSpPr>
+          <p:cNvPr id="16" name="직사각형 15">
+            <a:extLst>
+              <a:ext uri="{FF2B5EF4-FFF2-40B4-BE49-F238E27FC236}">
+                <a16:creationId xmlns:a16="http://schemas.microsoft.com/office/drawing/2014/main" id="{C2A1CFDE-104A-6548-A6F5-86CCCD43C3C6}"/>
+              </a:ext>
+            </a:extLst>
+          </p:cNvPr>
+          <p:cNvSpPr/>
+          <p:nvPr/>
+        </p:nvSpPr>
+        <p:spPr>
+          <a:xfrm>
+            <a:off x="4894025" y="4519769"/>
+            <a:ext cx="2403951" cy="722021"/>
+          </a:xfrm>
+          <a:prstGeom prst="rect">
+            <a:avLst/>
+          </a:prstGeom>
+          <a:solidFill>
+            <a:schemeClr val="bg1"/>
+          </a:solidFill>
+          <a:ln>
+            <a:solidFill>
+              <a:schemeClr val="bg1">
+                <a:lumMod val="75000"/>
+              </a:schemeClr>
+            </a:solidFill>
+          </a:ln>
+        </p:spPr>
+        <p:style>
+          <a:lnRef idx="2">
+            <a:schemeClr val="accent1">
+              <a:shade val="50000"/>
+            </a:schemeClr>
+          </a:lnRef>
+          <a:fillRef idx="1">
+            <a:schemeClr val="accent1"/>
+          </a:fillRef>
+          <a:effectRef idx="0">
+            <a:schemeClr val="accent1"/>
+          </a:effectRef>
+          <a:fontRef idx="minor">
+            <a:schemeClr val="lt1"/>
+          </a:fontRef>
+        </p:style>
+        <p:txBody>
+          <a:bodyPr rtlCol="0" anchor="ctr"/>
+          <a:lstStyle/>
+          <a:p>
+            <a:pPr algn="ctr"/>
+            <a:endParaRPr kumimoji="1" lang="ko-KR" altLang="en-US" dirty="0"/>
+          </a:p>
+        </p:txBody>
+      </p:sp>
+      <p:sp>
+        <p:nvSpPr>
+          <p:cNvPr id="21" name="모서리가 둥근 직사각형 20">
+            <a:extLst>
+              <a:ext uri="{FF2B5EF4-FFF2-40B4-BE49-F238E27FC236}">
+                <a16:creationId xmlns:a16="http://schemas.microsoft.com/office/drawing/2014/main" id="{EA113DB3-6898-EF41-A8EF-F40F5C1C3CAA}"/>
+              </a:ext>
+            </a:extLst>
+          </p:cNvPr>
+          <p:cNvSpPr/>
+          <p:nvPr/>
+        </p:nvSpPr>
+        <p:spPr>
+          <a:xfrm>
+            <a:off x="5171838" y="4724642"/>
+            <a:ext cx="1848323" cy="312275"/>
+          </a:xfrm>
+          <a:prstGeom prst="roundRect">
+            <a:avLst>
+              <a:gd name="adj" fmla="val 12230"/>
+            </a:avLst>
+          </a:prstGeom>
+          <a:solidFill>
+            <a:srgbClr val="00A5FA"/>
+          </a:solidFill>
+          <a:ln>
+            <a:solidFill>
+              <a:srgbClr val="00B0F0"/>
+            </a:solidFill>
+          </a:ln>
+        </p:spPr>
+        <p:style>
+          <a:lnRef idx="2">
+            <a:schemeClr val="accent1">
+              <a:shade val="50000"/>
+            </a:schemeClr>
+          </a:lnRef>
+          <a:fillRef idx="1">
+            <a:schemeClr val="accent1"/>
+          </a:fillRef>
+          <a:effectRef idx="0">
+            <a:schemeClr val="accent1"/>
+          </a:effectRef>
+          <a:fontRef idx="minor">
+            <a:schemeClr val="lt1"/>
+          </a:fontRef>
+        </p:style>
+        <p:txBody>
+          <a:bodyPr rot="0" spcFirstLastPara="0" vertOverflow="overflow" horzOverflow="overflow" vert="horz" wrap="square" lIns="91440" tIns="45720" rIns="91440" bIns="45720" numCol="1" spcCol="0" rtlCol="0" fromWordArt="0" anchor="ctr" anchorCtr="0" forceAA="0" compatLnSpc="1">
+            <a:prstTxWarp prst="textNoShape">
+              <a:avLst/>
+            </a:prstTxWarp>
+            <a:noAutofit/>
+          </a:bodyPr>
+          <a:lstStyle/>
+          <a:p>
+            <a:pPr algn="ctr"/>
+            <a:r>
+              <a:rPr kumimoji="1" lang="ko-KR" altLang="en-US" sz="1000" b="1" dirty="0">
+                <a:solidFill>
+                  <a:schemeClr val="bg1"/>
+                </a:solidFill>
+              </a:rPr>
+              <a:t>비회원 입장</a:t>
+            </a:r>
+          </a:p>
+        </p:txBody>
+      </p:sp>
+      <p:sp>
+        <p:nvSpPr>
+          <p:cNvPr id="19" name="TextBox 18">
+            <a:extLst>
+              <a:ext uri="{FF2B5EF4-FFF2-40B4-BE49-F238E27FC236}">
+                <a16:creationId xmlns:a16="http://schemas.microsoft.com/office/drawing/2014/main" id="{314C8372-ECD8-DB49-937C-CD4D47D9B04E}"/>
+              </a:ext>
+            </a:extLst>
+          </p:cNvPr>
+          <p:cNvSpPr txBox="1"/>
+          <p:nvPr/>
+        </p:nvSpPr>
+        <p:spPr>
+          <a:xfrm>
+            <a:off x="5423250" y="2785002"/>
+            <a:ext cx="1359668" cy="246221"/>
+          </a:xfrm>
+          <a:prstGeom prst="rect">
+            <a:avLst/>
+          </a:prstGeom>
+          <a:noFill/>
+        </p:spPr>
+        <p:txBody>
+          <a:bodyPr wrap="none" rtlCol="0">
+            <a:spAutoFit/>
+          </a:bodyPr>
+          <a:lstStyle/>
+          <a:p>
+            <a:pPr algn="ctr"/>
+            <a:r>
+              <a:rPr kumimoji="1" lang="ko-KR" altLang="en-US" sz="1000" dirty="0"/>
+              <a:t>지금 계정으로 입장</a:t>
+            </a:r>
+            <a:r>
+              <a:rPr kumimoji="1" lang="en-US" altLang="ko-KR" sz="1000" dirty="0"/>
+              <a:t>?</a:t>
+            </a:r>
+            <a:endParaRPr kumimoji="1" lang="ko-KR" altLang="en-US" sz="1000" dirty="0">
+              <a:solidFill>
+                <a:srgbClr val="00B0F0"/>
+              </a:solidFill>
+            </a:endParaRPr>
+          </a:p>
+        </p:txBody>
+      </p:sp>
+      <p:sp>
+        <p:nvSpPr>
+          <p:cNvPr id="20" name="TextBox 19">
+            <a:extLst>
+              <a:ext uri="{FF2B5EF4-FFF2-40B4-BE49-F238E27FC236}">
+                <a16:creationId xmlns:a16="http://schemas.microsoft.com/office/drawing/2014/main" id="{4C2ABC4A-20F0-664E-94FD-BD2550BC8391}"/>
+              </a:ext>
+            </a:extLst>
+          </p:cNvPr>
+          <p:cNvSpPr txBox="1"/>
+          <p:nvPr/>
+        </p:nvSpPr>
+        <p:spPr>
+          <a:xfrm>
+            <a:off x="5327684" y="2246224"/>
+            <a:ext cx="1536639" cy="338554"/>
+          </a:xfrm>
+          <a:prstGeom prst="rect">
+            <a:avLst/>
+          </a:prstGeom>
+          <a:noFill/>
+        </p:spPr>
+        <p:txBody>
+          <a:bodyPr wrap="none" rtlCol="0">
+            <a:spAutoFit/>
+          </a:bodyPr>
+          <a:lstStyle/>
+          <a:p>
+            <a:pPr algn="ctr"/>
+            <a:r>
+              <a:rPr kumimoji="1" lang="en-US" altLang="ko-KR" sz="1600" dirty="0"/>
+              <a:t>redLoadEast13</a:t>
+            </a:r>
+            <a:endParaRPr kumimoji="1" lang="ko-KR" altLang="en-US" sz="1600" dirty="0"/>
+          </a:p>
+        </p:txBody>
+      </p:sp>
+      <p:cxnSp>
+        <p:nvCxnSpPr>
+          <p:cNvPr id="24" name="직선 연결선[R] 23">
+            <a:extLst>
+              <a:ext uri="{FF2B5EF4-FFF2-40B4-BE49-F238E27FC236}">
+                <a16:creationId xmlns:a16="http://schemas.microsoft.com/office/drawing/2014/main" id="{7B185AE7-DD27-6641-A29E-B889C86AEC4D}"/>
+              </a:ext>
+            </a:extLst>
+          </p:cNvPr>
+          <p:cNvCxnSpPr/>
+          <p:nvPr/>
+        </p:nvCxnSpPr>
+        <p:spPr>
+          <a:xfrm>
+            <a:off x="5325648" y="2584778"/>
+            <a:ext cx="1529947" cy="0"/>
+          </a:xfrm>
+          <a:prstGeom prst="line">
+            <a:avLst/>
+          </a:prstGeom>
+          <a:ln>
+            <a:solidFill>
+              <a:srgbClr val="00B0F0"/>
+            </a:solidFill>
+          </a:ln>
+        </p:spPr>
+        <p:style>
+          <a:lnRef idx="1">
+            <a:schemeClr val="accent1"/>
+          </a:lnRef>
+          <a:fillRef idx="0">
+            <a:schemeClr val="accent1"/>
+          </a:fillRef>
+          <a:effectRef idx="0">
+            <a:schemeClr val="accent1"/>
+          </a:effectRef>
+          <a:fontRef idx="minor">
+            <a:schemeClr val="tx1"/>
+          </a:fontRef>
+        </p:style>
+      </p:cxnSp>
+      <p:sp>
+        <p:nvSpPr>
+          <p:cNvPr id="25" name="모서리가 둥근 직사각형 24">
+            <a:extLst>
+              <a:ext uri="{FF2B5EF4-FFF2-40B4-BE49-F238E27FC236}">
+                <a16:creationId xmlns:a16="http://schemas.microsoft.com/office/drawing/2014/main" id="{4D54DDCA-05D6-254F-98FE-5846446CF0D5}"/>
+              </a:ext>
+            </a:extLst>
+          </p:cNvPr>
+          <p:cNvSpPr/>
+          <p:nvPr/>
+        </p:nvSpPr>
+        <p:spPr>
+          <a:xfrm>
+            <a:off x="5171838" y="3121959"/>
+            <a:ext cx="1848323" cy="234616"/>
+          </a:xfrm>
+          <a:prstGeom prst="roundRect">
+            <a:avLst>
+              <a:gd name="adj" fmla="val 12230"/>
+            </a:avLst>
+          </a:prstGeom>
+          <a:solidFill>
+            <a:srgbClr val="00A5FA"/>
+          </a:solidFill>
+          <a:ln>
+            <a:solidFill>
+              <a:srgbClr val="00B0F0"/>
+            </a:solidFill>
+          </a:ln>
+        </p:spPr>
+        <p:style>
+          <a:lnRef idx="2">
+            <a:schemeClr val="accent1">
+              <a:shade val="50000"/>
+            </a:schemeClr>
+          </a:lnRef>
+          <a:fillRef idx="1">
+            <a:schemeClr val="accent1"/>
+          </a:fillRef>
+          <a:effectRef idx="0">
+            <a:schemeClr val="accent1"/>
+          </a:effectRef>
+          <a:fontRef idx="minor">
+            <a:schemeClr val="lt1"/>
+          </a:fontRef>
+        </p:style>
+        <p:txBody>
+          <a:bodyPr rot="0" spcFirstLastPara="0" vertOverflow="overflow" horzOverflow="overflow" vert="horz" wrap="square" lIns="91440" tIns="45720" rIns="91440" bIns="45720" numCol="1" spcCol="0" rtlCol="0" fromWordArt="0" anchor="ctr" anchorCtr="0" forceAA="0" compatLnSpc="1">
+            <a:prstTxWarp prst="textNoShape">
+              <a:avLst/>
+            </a:prstTxWarp>
+            <a:noAutofit/>
+          </a:bodyPr>
+          <a:lstStyle/>
+          <a:p>
+            <a:pPr algn="ctr"/>
+            <a:r>
+              <a:rPr kumimoji="1" lang="ko-KR" altLang="en-US" sz="1000" dirty="0">
+                <a:solidFill>
+                  <a:schemeClr val="bg1"/>
+                </a:solidFill>
+              </a:rPr>
+              <a:t>입장</a:t>
+            </a:r>
+          </a:p>
+        </p:txBody>
+      </p:sp>
+    </p:spTree>
+    <p:extLst>
+      <p:ext uri="{BB962C8B-B14F-4D97-AF65-F5344CB8AC3E}">
+        <p14:creationId xmlns:p14="http://schemas.microsoft.com/office/powerpoint/2010/main" val="1290991164"/>
       </p:ext>
     </p:extLst>
   </p:cSld>

</xml_diff>